<commit_message>
:dizzy: arquitectura de conexion 4-0
</commit_message>
<xml_diff>
--- a/Industria-4-0/Arquitectura de Conexion.pptx
+++ b/Industria-4-0/Arquitectura de Conexion.pptx
@@ -200,7 +200,7 @@
           <a:p>
             <a:fld id="{6EE5F46D-828F-43B4-905F-73CBFE9BB133}" type="datetimeFigureOut">
               <a:rPr lang="es-CO" smtClean="0"/>
-              <a:t>9/03/23</a:t>
+              <a:t>29/05/23</a:t>
             </a:fld>
             <a:endParaRPr lang="es-CO"/>
           </a:p>
@@ -617,7 +617,7 @@
           <a:p>
             <a:fld id="{74BE6EB6-23C4-4AF1-A0C5-E552D57B19B0}" type="datetimeFigureOut">
               <a:rPr lang="es-CO" smtClean="0"/>
-              <a:t>9/03/23</a:t>
+              <a:t>29/05/23</a:t>
             </a:fld>
             <a:endParaRPr lang="es-CO"/>
           </a:p>
@@ -817,7 +817,7 @@
           <a:p>
             <a:fld id="{74BE6EB6-23C4-4AF1-A0C5-E552D57B19B0}" type="datetimeFigureOut">
               <a:rPr lang="es-CO" smtClean="0"/>
-              <a:t>9/03/23</a:t>
+              <a:t>29/05/23</a:t>
             </a:fld>
             <a:endParaRPr lang="es-CO"/>
           </a:p>
@@ -1027,7 +1027,7 @@
           <a:p>
             <a:fld id="{74BE6EB6-23C4-4AF1-A0C5-E552D57B19B0}" type="datetimeFigureOut">
               <a:rPr lang="es-CO" smtClean="0"/>
-              <a:t>9/03/23</a:t>
+              <a:t>29/05/23</a:t>
             </a:fld>
             <a:endParaRPr lang="es-CO"/>
           </a:p>
@@ -3693,7 +3693,7 @@
           <a:p>
             <a:fld id="{74BE6EB6-23C4-4AF1-A0C5-E552D57B19B0}" type="datetimeFigureOut">
               <a:rPr lang="es-CO" smtClean="0"/>
-              <a:t>9/03/23</a:t>
+              <a:t>29/05/23</a:t>
             </a:fld>
             <a:endParaRPr lang="es-CO"/>
           </a:p>
@@ -5786,7 +5786,7 @@
           <a:p>
             <a:fld id="{74BE6EB6-23C4-4AF1-A0C5-E552D57B19B0}" type="datetimeFigureOut">
               <a:rPr lang="es-CO" smtClean="0"/>
-              <a:t>9/03/23</a:t>
+              <a:t>29/05/23</a:t>
             </a:fld>
             <a:endParaRPr lang="es-CO"/>
           </a:p>
@@ -8599,7 +8599,7 @@
           <a:p>
             <a:fld id="{74BE6EB6-23C4-4AF1-A0C5-E552D57B19B0}" type="datetimeFigureOut">
               <a:rPr lang="es-CO" smtClean="0"/>
-              <a:t>9/03/23</a:t>
+              <a:t>29/05/23</a:t>
             </a:fld>
             <a:endParaRPr lang="es-CO"/>
           </a:p>
@@ -11746,7 +11746,7 @@
           <a:p>
             <a:fld id="{74BE6EB6-23C4-4AF1-A0C5-E552D57B19B0}" type="datetimeFigureOut">
               <a:rPr lang="es-CO" smtClean="0"/>
-              <a:t>9/03/23</a:t>
+              <a:t>29/05/23</a:t>
             </a:fld>
             <a:endParaRPr lang="es-CO"/>
           </a:p>
@@ -13613,7 +13613,7 @@
           <a:p>
             <a:fld id="{74BE6EB6-23C4-4AF1-A0C5-E552D57B19B0}" type="datetimeFigureOut">
               <a:rPr lang="es-CO" smtClean="0"/>
-              <a:t>9/03/23</a:t>
+              <a:t>29/05/23</a:t>
             </a:fld>
             <a:endParaRPr lang="es-CO"/>
           </a:p>
@@ -16148,7 +16148,7 @@
           <a:p>
             <a:fld id="{74BE6EB6-23C4-4AF1-A0C5-E552D57B19B0}" type="datetimeFigureOut">
               <a:rPr lang="es-CO" smtClean="0"/>
-              <a:t>9/03/23</a:t>
+              <a:t>29/05/23</a:t>
             </a:fld>
             <a:endParaRPr lang="es-CO"/>
           </a:p>
@@ -18712,7 +18712,7 @@
           <a:p>
             <a:fld id="{74BE6EB6-23C4-4AF1-A0C5-E552D57B19B0}" type="datetimeFigureOut">
               <a:rPr lang="es-CO" smtClean="0"/>
-              <a:t>9/03/23</a:t>
+              <a:t>29/05/23</a:t>
             </a:fld>
             <a:endParaRPr lang="es-CO"/>
           </a:p>
@@ -20778,7 +20778,7 @@
           <a:p>
             <a:fld id="{74BE6EB6-23C4-4AF1-A0C5-E552D57B19B0}" type="datetimeFigureOut">
               <a:rPr lang="es-CO" smtClean="0"/>
-              <a:t>9/03/23</a:t>
+              <a:t>29/05/23</a:t>
             </a:fld>
             <a:endParaRPr lang="es-CO"/>
           </a:p>
@@ -21390,7 +21390,7 @@
           <a:p>
             <a:fld id="{74BE6EB6-23C4-4AF1-A0C5-E552D57B19B0}" type="datetimeFigureOut">
               <a:rPr lang="es-CO" smtClean="0"/>
-              <a:t>9/03/23</a:t>
+              <a:t>29/05/23</a:t>
             </a:fld>
             <a:endParaRPr lang="es-CO"/>
           </a:p>
@@ -26332,11 +26332,13 @@
         </p:nvSpPr>
         <p:spPr>
           <a:xfrm>
-            <a:off x="9300211" y="524051"/>
-            <a:ext cx="2057506" cy="5221682"/>
+            <a:off x="7304237" y="233296"/>
+            <a:ext cx="4595232" cy="6491304"/>
           </a:xfrm>
           <a:prstGeom prst="roundRect">
-            <a:avLst/>
+            <a:avLst>
+              <a:gd name="adj" fmla="val 3286"/>
+            </a:avLst>
           </a:prstGeom>
           <a:solidFill>
             <a:srgbClr val="DEEBF7">
@@ -26383,16 +26385,20 @@
         </p:nvSpPr>
         <p:spPr>
           <a:xfrm>
-            <a:off x="4246336" y="5321697"/>
-            <a:ext cx="2057506" cy="1410555"/>
+            <a:off x="117151" y="5192991"/>
+            <a:ext cx="3586652" cy="1505206"/>
           </a:xfrm>
           <a:prstGeom prst="roundRect">
-            <a:avLst/>
+            <a:avLst>
+              <a:gd name="adj" fmla="val 6862"/>
+            </a:avLst>
           </a:prstGeom>
           <a:solidFill>
-            <a:srgbClr val="DEEBF7">
+            <a:schemeClr val="accent3">
+              <a:lumMod val="20000"/>
+              <a:lumOff val="80000"/>
               <a:alpha val="81876"/>
-            </a:srgbClr>
+            </a:schemeClr>
           </a:solidFill>
         </p:spPr>
         <p:style>
@@ -26434,16 +26440,20 @@
         </p:nvSpPr>
         <p:spPr>
           <a:xfrm>
-            <a:off x="3904485" y="125748"/>
-            <a:ext cx="2400982" cy="1916222"/>
+            <a:off x="117151" y="157276"/>
+            <a:ext cx="3593458" cy="2078175"/>
           </a:xfrm>
           <a:prstGeom prst="roundRect">
-            <a:avLst/>
+            <a:avLst>
+              <a:gd name="adj" fmla="val 7677"/>
+            </a:avLst>
           </a:prstGeom>
           <a:solidFill>
-            <a:srgbClr val="DEEBF7">
+            <a:schemeClr val="accent3">
+              <a:lumMod val="20000"/>
+              <a:lumOff val="80000"/>
               <a:alpha val="81876"/>
-            </a:srgbClr>
+            </a:schemeClr>
           </a:solidFill>
         </p:spPr>
         <p:style>
@@ -26485,16 +26495,20 @@
         </p:nvSpPr>
         <p:spPr>
           <a:xfrm>
-            <a:off x="922876" y="2557042"/>
-            <a:ext cx="5486400" cy="2042828"/>
+            <a:off x="117151" y="2657194"/>
+            <a:ext cx="3586652" cy="2078175"/>
           </a:xfrm>
           <a:prstGeom prst="roundRect">
-            <a:avLst/>
+            <a:avLst>
+              <a:gd name="adj" fmla="val 7133"/>
+            </a:avLst>
           </a:prstGeom>
           <a:solidFill>
-            <a:srgbClr val="DEEBF7">
+            <a:schemeClr val="accent3">
+              <a:lumMod val="20000"/>
+              <a:lumOff val="80000"/>
               <a:alpha val="81876"/>
-            </a:srgbClr>
+            </a:schemeClr>
           </a:solidFill>
         </p:spPr>
         <p:style>
@@ -26551,7 +26565,7 @@
         </p:blipFill>
         <p:spPr bwMode="auto">
           <a:xfrm>
-            <a:off x="508227" y="3607851"/>
+            <a:off x="280298" y="3396403"/>
             <a:ext cx="718810" cy="718810"/>
           </a:xfrm>
           <a:prstGeom prst="rect">
@@ -26598,8 +26612,8 @@
         </p:blipFill>
         <p:spPr bwMode="auto">
           <a:xfrm>
-            <a:off x="3417590" y="666162"/>
-            <a:ext cx="722689" cy="722689"/>
+            <a:off x="185903" y="1390072"/>
+            <a:ext cx="501402" cy="501402"/>
           </a:xfrm>
           <a:prstGeom prst="rect">
             <a:avLst/>
@@ -26645,55 +26659,8 @@
         </p:blipFill>
         <p:spPr bwMode="auto">
           <a:xfrm>
-            <a:off x="3749745" y="5589045"/>
-            <a:ext cx="718810" cy="718810"/>
-          </a:xfrm>
-          <a:prstGeom prst="rect">
-            <a:avLst/>
-          </a:prstGeom>
-          <a:noFill/>
-          <a:extLst>
-            <a:ext uri="{909E8E84-426E-40DD-AFC4-6F175D3DCCD1}">
-              <a14:hiddenFill xmlns:a14="http://schemas.microsoft.com/office/drawing/2010/main">
-                <a:solidFill>
-                  <a:srgbClr val="FFFFFF"/>
-                </a:solidFill>
-              </a14:hiddenFill>
-            </a:ext>
-          </a:extLst>
-        </p:spPr>
-      </p:pic>
-      <p:pic>
-        <p:nvPicPr>
-          <p:cNvPr id="1030" name="Picture 6">
-            <a:extLst>
-              <a:ext uri="{FF2B5EF4-FFF2-40B4-BE49-F238E27FC236}">
-                <a16:creationId xmlns:a16="http://schemas.microsoft.com/office/drawing/2014/main" id="{800C206F-8719-71F4-CC03-8165A4E92430}"/>
-              </a:ext>
-            </a:extLst>
-          </p:cNvPr>
-          <p:cNvPicPr>
-            <a:picLocks noChangeAspect="1" noChangeArrowheads="1"/>
-          </p:cNvPicPr>
-          <p:nvPr/>
-        </p:nvPicPr>
-        <p:blipFill>
-          <a:blip r:embed="rId4">
-            <a:extLst>
-              <a:ext uri="{28A0092B-C50C-407E-A947-70E740481C1C}">
-                <a14:useLocalDpi xmlns:a14="http://schemas.microsoft.com/office/drawing/2010/main" val="0"/>
-              </a:ext>
-            </a:extLst>
-          </a:blip>
-          <a:srcRect/>
-          <a:stretch>
-            <a:fillRect/>
-          </a:stretch>
-        </p:blipFill>
-        <p:spPr bwMode="auto">
-          <a:xfrm>
-            <a:off x="10608577" y="4999765"/>
-            <a:ext cx="1178560" cy="1178560"/>
+            <a:off x="160335" y="5897736"/>
+            <a:ext cx="510269" cy="510269"/>
           </a:xfrm>
           <a:prstGeom prst="rect">
             <a:avLst/>
@@ -26724,10 +26691,10 @@
         </p:nvGrpSpPr>
         <p:grpSpPr>
           <a:xfrm>
-            <a:off x="4092184" y="2132442"/>
-            <a:ext cx="903292" cy="600570"/>
-            <a:chOff x="3252148" y="3432950"/>
-            <a:chExt cx="903292" cy="600570"/>
+            <a:off x="707201" y="2301080"/>
+            <a:ext cx="906288" cy="614518"/>
+            <a:chOff x="3249152" y="3419002"/>
+            <a:chExt cx="906288" cy="614518"/>
           </a:xfrm>
         </p:grpSpPr>
         <p:pic>
@@ -26745,7 +26712,7 @@
             <p:nvPr/>
           </p:nvPicPr>
           <p:blipFill>
-            <a:blip r:embed="rId5">
+            <a:blip r:embed="rId4">
               <a:extLst>
                 <a:ext uri="{28A0092B-C50C-407E-A947-70E740481C1C}">
                   <a14:useLocalDpi xmlns:a14="http://schemas.microsoft.com/office/drawing/2010/main" val="0"/>
@@ -26791,7 +26758,7 @@
           </p:nvSpPr>
           <p:spPr>
             <a:xfrm>
-              <a:off x="3252148" y="3432950"/>
+              <a:off x="3249152" y="3419002"/>
               <a:ext cx="583814" cy="369332"/>
             </a:xfrm>
             <a:prstGeom prst="rect">
@@ -26827,10 +26794,10 @@
         </p:nvGrpSpPr>
         <p:grpSpPr>
           <a:xfrm>
-            <a:off x="4199900" y="4396756"/>
-            <a:ext cx="843304" cy="688988"/>
-            <a:chOff x="3312136" y="3611880"/>
-            <a:chExt cx="843304" cy="688988"/>
+            <a:off x="899380" y="4448943"/>
+            <a:ext cx="804725" cy="699903"/>
+            <a:chOff x="3162163" y="4052029"/>
+            <a:chExt cx="804725" cy="699903"/>
           </a:xfrm>
         </p:grpSpPr>
         <p:pic>
@@ -26848,7 +26815,7 @@
             <p:nvPr/>
           </p:nvPicPr>
           <p:blipFill>
-            <a:blip r:embed="rId5">
+            <a:blip r:embed="rId4">
               <a:extLst>
                 <a:ext uri="{28A0092B-C50C-407E-A947-70E740481C1C}">
                   <a14:useLocalDpi xmlns:a14="http://schemas.microsoft.com/office/drawing/2010/main" val="0"/>
@@ -26862,7 +26829,7 @@
           </p:blipFill>
           <p:spPr bwMode="auto">
             <a:xfrm>
-              <a:off x="3733800" y="3611880"/>
+              <a:off x="3545248" y="4052029"/>
               <a:ext cx="421640" cy="421640"/>
             </a:xfrm>
             <a:prstGeom prst="rect">
@@ -26894,7 +26861,7 @@
           </p:nvSpPr>
           <p:spPr>
             <a:xfrm>
-              <a:off x="3312136" y="3931536"/>
+              <a:off x="3162163" y="4382600"/>
               <a:ext cx="583814" cy="369332"/>
             </a:xfrm>
             <a:prstGeom prst="rect">
@@ -26931,11 +26898,11 @@
           <p:nvPr/>
         </p:nvPicPr>
         <p:blipFill rotWithShape="1">
-          <a:blip r:embed="rId6">
+          <a:blip r:embed="rId5">
             <a:extLst>
               <a:ext uri="{BEBA8EAE-BF5A-486C-A8C5-ECC9F3942E4B}">
                 <a14:imgProps xmlns:a14="http://schemas.microsoft.com/office/drawing/2010/main">
-                  <a14:imgLayer r:embed="rId7">
+                  <a14:imgLayer r:embed="rId6">
                     <a14:imgEffect>
                       <a14:backgroundRemoval t="10247" b="42874" l="44459" r="56561">
                         <a14:foregroundMark x1="46115" y1="19435" x2="45478" y2="34393"/>
@@ -26967,8 +26934,8 @@
         </p:blipFill>
         <p:spPr bwMode="auto">
           <a:xfrm>
-            <a:off x="4697265" y="5471541"/>
-            <a:ext cx="784710" cy="1068077"/>
+            <a:off x="1887939" y="1175980"/>
+            <a:ext cx="643423" cy="875770"/>
           </a:xfrm>
           <a:prstGeom prst="rect">
             <a:avLst/>
@@ -26987,10 +26954,162 @@
       </p:pic>
       <p:pic>
         <p:nvPicPr>
-          <p:cNvPr id="13" name="Picture 10" descr="Standard Architecture - Ignition User Manual 8.1 - Ignition Documentation">
+          <p:cNvPr id="1040" name="Picture 16" descr="Icon for ABB RobotStudio · Issue #1870 · simple-icons/simple-icons · GitHub">
             <a:extLst>
               <a:ext uri="{FF2B5EF4-FFF2-40B4-BE49-F238E27FC236}">
-                <a16:creationId xmlns:a16="http://schemas.microsoft.com/office/drawing/2014/main" id="{7804B373-269E-0098-63BA-093A49F8A8B5}"/>
+                <a16:creationId xmlns:a16="http://schemas.microsoft.com/office/drawing/2014/main" id="{55072DB8-7E75-3908-112D-A9B1A9763434}"/>
+              </a:ext>
+            </a:extLst>
+          </p:cNvPr>
+          <p:cNvPicPr>
+            <a:picLocks noChangeAspect="1" noChangeArrowheads="1"/>
+          </p:cNvPicPr>
+          <p:nvPr/>
+        </p:nvPicPr>
+        <p:blipFill>
+          <a:blip r:embed="rId7">
+            <a:extLst>
+              <a:ext uri="{28A0092B-C50C-407E-A947-70E740481C1C}">
+                <a14:useLocalDpi xmlns:a14="http://schemas.microsoft.com/office/drawing/2010/main" val="0"/>
+              </a:ext>
+            </a:extLst>
+          </a:blip>
+          <a:srcRect/>
+          <a:stretch>
+            <a:fillRect/>
+          </a:stretch>
+        </p:blipFill>
+        <p:spPr bwMode="auto">
+          <a:xfrm>
+            <a:off x="2947792" y="5853397"/>
+            <a:ext cx="479486" cy="479486"/>
+          </a:xfrm>
+          <a:prstGeom prst="rect">
+            <a:avLst/>
+          </a:prstGeom>
+          <a:noFill/>
+          <a:extLst>
+            <a:ext uri="{909E8E84-426E-40DD-AFC4-6F175D3DCCD1}">
+              <a14:hiddenFill xmlns:a14="http://schemas.microsoft.com/office/drawing/2010/main">
+                <a:solidFill>
+                  <a:srgbClr val="FFFFFF"/>
+                </a:solidFill>
+              </a14:hiddenFill>
+            </a:ext>
+          </a:extLst>
+        </p:spPr>
+      </p:pic>
+      <p:sp>
+        <p:nvSpPr>
+          <p:cNvPr id="1041" name="TextBox 1040">
+            <a:extLst>
+              <a:ext uri="{FF2B5EF4-FFF2-40B4-BE49-F238E27FC236}">
+                <a16:creationId xmlns:a16="http://schemas.microsoft.com/office/drawing/2014/main" id="{2F7F26C4-FC26-7384-1560-4B8C7AAD1251}"/>
+              </a:ext>
+            </a:extLst>
+          </p:cNvPr>
+          <p:cNvSpPr txBox="1"/>
+          <p:nvPr/>
+        </p:nvSpPr>
+        <p:spPr>
+          <a:xfrm>
+            <a:off x="1458296" y="3648540"/>
+            <a:ext cx="1410964" cy="369332"/>
+          </a:xfrm>
+          <a:prstGeom prst="rect">
+            <a:avLst/>
+          </a:prstGeom>
+          <a:noFill/>
+        </p:spPr>
+        <p:txBody>
+          <a:bodyPr wrap="none" rtlCol="0">
+            <a:spAutoFit/>
+          </a:bodyPr>
+          <a:lstStyle/>
+          <a:p>
+            <a:r>
+              <a:rPr lang="en-CO" dirty="0"/>
+              <a:t>10.203.3.247</a:t>
+            </a:r>
+          </a:p>
+        </p:txBody>
+      </p:sp>
+      <p:sp>
+        <p:nvSpPr>
+          <p:cNvPr id="1043" name="TextBox 1042">
+            <a:extLst>
+              <a:ext uri="{FF2B5EF4-FFF2-40B4-BE49-F238E27FC236}">
+                <a16:creationId xmlns:a16="http://schemas.microsoft.com/office/drawing/2014/main" id="{74803D03-E6F0-531D-D9B6-C3DA34148B05}"/>
+              </a:ext>
+            </a:extLst>
+          </p:cNvPr>
+          <p:cNvSpPr txBox="1"/>
+          <p:nvPr/>
+        </p:nvSpPr>
+        <p:spPr>
+          <a:xfrm>
+            <a:off x="117151" y="1890571"/>
+            <a:ext cx="596638" cy="369332"/>
+          </a:xfrm>
+          <a:prstGeom prst="rect">
+            <a:avLst/>
+          </a:prstGeom>
+          <a:noFill/>
+        </p:spPr>
+        <p:txBody>
+          <a:bodyPr wrap="none" rtlCol="0">
+            <a:spAutoFit/>
+          </a:bodyPr>
+          <a:lstStyle/>
+          <a:p>
+            <a:r>
+              <a:rPr lang="en-CO" b="1" dirty="0"/>
+              <a:t>PC 1</a:t>
+            </a:r>
+          </a:p>
+        </p:txBody>
+      </p:sp>
+      <p:sp>
+        <p:nvSpPr>
+          <p:cNvPr id="1045" name="TextBox 1044">
+            <a:extLst>
+              <a:ext uri="{FF2B5EF4-FFF2-40B4-BE49-F238E27FC236}">
+                <a16:creationId xmlns:a16="http://schemas.microsoft.com/office/drawing/2014/main" id="{7BAA2DD2-F1D0-1861-3A60-39E709448129}"/>
+              </a:ext>
+            </a:extLst>
+          </p:cNvPr>
+          <p:cNvSpPr txBox="1"/>
+          <p:nvPr/>
+        </p:nvSpPr>
+        <p:spPr>
+          <a:xfrm>
+            <a:off x="90667" y="6373010"/>
+            <a:ext cx="596638" cy="369332"/>
+          </a:xfrm>
+          <a:prstGeom prst="rect">
+            <a:avLst/>
+          </a:prstGeom>
+          <a:noFill/>
+        </p:spPr>
+        <p:txBody>
+          <a:bodyPr wrap="none" rtlCol="0">
+            <a:spAutoFit/>
+          </a:bodyPr>
+          <a:lstStyle/>
+          <a:p>
+            <a:r>
+              <a:rPr lang="en-CO" b="1" dirty="0"/>
+              <a:t>PC 2</a:t>
+            </a:r>
+          </a:p>
+        </p:txBody>
+      </p:sp>
+      <p:pic>
+        <p:nvPicPr>
+          <p:cNvPr id="3" name="Picture 10" descr="Standard Architecture - Ignition User Manual 8.1 - Ignition Documentation">
+            <a:extLst>
+              <a:ext uri="{FF2B5EF4-FFF2-40B4-BE49-F238E27FC236}">
+                <a16:creationId xmlns:a16="http://schemas.microsoft.com/office/drawing/2014/main" id="{8758159D-440D-32FF-4000-D20A584B6599}"/>
               </a:ext>
             </a:extLst>
           </p:cNvPr>
@@ -27000,11 +27119,11 @@
           <p:nvPr/>
         </p:nvPicPr>
         <p:blipFill rotWithShape="1">
-          <a:blip r:embed="rId6">
+          <a:blip r:embed="rId5">
             <a:extLst>
               <a:ext uri="{BEBA8EAE-BF5A-486C-A8C5-ECC9F3942E4B}">
                 <a14:imgProps xmlns:a14="http://schemas.microsoft.com/office/drawing/2010/main">
-                  <a14:imgLayer r:embed="rId7">
+                  <a14:imgLayer r:embed="rId6">
                     <a14:imgEffect>
                       <a14:backgroundRemoval t="10247" b="42874" l="44459" r="56561">
                         <a14:foregroundMark x1="46115" y1="19435" x2="45478" y2="34393"/>
@@ -27036,7 +27155,7 @@
         </p:blipFill>
         <p:spPr bwMode="auto">
           <a:xfrm>
-            <a:off x="9979305" y="1324445"/>
+            <a:off x="1183344" y="5576578"/>
             <a:ext cx="784710" cy="1068077"/>
           </a:xfrm>
           <a:prstGeom prst="rect">
@@ -27054,6 +27173,96 @@
           </a:extLst>
         </p:spPr>
       </p:pic>
+      <p:sp>
+        <p:nvSpPr>
+          <p:cNvPr id="49" name="TextBox 48">
+            <a:extLst>
+              <a:ext uri="{FF2B5EF4-FFF2-40B4-BE49-F238E27FC236}">
+                <a16:creationId xmlns:a16="http://schemas.microsoft.com/office/drawing/2014/main" id="{EBA25648-B911-4256-3A74-5CE8384B217F}"/>
+              </a:ext>
+            </a:extLst>
+          </p:cNvPr>
+          <p:cNvSpPr txBox="1"/>
+          <p:nvPr/>
+        </p:nvSpPr>
+        <p:spPr>
+          <a:xfrm>
+            <a:off x="170054" y="4109176"/>
+            <a:ext cx="2008948" cy="369332"/>
+          </a:xfrm>
+          <a:prstGeom prst="rect">
+            <a:avLst/>
+          </a:prstGeom>
+          <a:noFill/>
+        </p:spPr>
+        <p:txBody>
+          <a:bodyPr wrap="none" rtlCol="0">
+            <a:spAutoFit/>
+          </a:bodyPr>
+          <a:lstStyle/>
+          <a:p>
+            <a:r>
+              <a:rPr lang="en-CO" dirty="0"/>
+              <a:t>Enterprise Network</a:t>
+            </a:r>
+          </a:p>
+        </p:txBody>
+      </p:sp>
+      <p:sp>
+        <p:nvSpPr>
+          <p:cNvPr id="54" name="Rounded Rectangle 53">
+            <a:extLst>
+              <a:ext uri="{FF2B5EF4-FFF2-40B4-BE49-F238E27FC236}">
+                <a16:creationId xmlns:a16="http://schemas.microsoft.com/office/drawing/2014/main" id="{C6F28B70-6071-1889-DDFE-D740620ACF1C}"/>
+              </a:ext>
+            </a:extLst>
+          </p:cNvPr>
+          <p:cNvSpPr/>
+          <p:nvPr/>
+        </p:nvSpPr>
+        <p:spPr>
+          <a:xfrm>
+            <a:off x="227084" y="243738"/>
+            <a:ext cx="3331184" cy="764728"/>
+          </a:xfrm>
+          <a:prstGeom prst="roundRect">
+            <a:avLst>
+              <a:gd name="adj" fmla="val 7677"/>
+            </a:avLst>
+          </a:prstGeom>
+          <a:solidFill>
+            <a:schemeClr val="accent3">
+              <a:lumMod val="20000"/>
+              <a:lumOff val="80000"/>
+              <a:alpha val="81876"/>
+            </a:schemeClr>
+          </a:solidFill>
+        </p:spPr>
+        <p:style>
+          <a:lnRef idx="2">
+            <a:schemeClr val="accent1">
+              <a:shade val="50000"/>
+            </a:schemeClr>
+          </a:lnRef>
+          <a:fillRef idx="1">
+            <a:schemeClr val="accent1"/>
+          </a:fillRef>
+          <a:effectRef idx="0">
+            <a:schemeClr val="accent1"/>
+          </a:effectRef>
+          <a:fontRef idx="minor">
+            <a:schemeClr val="lt1"/>
+          </a:fontRef>
+        </p:style>
+        <p:txBody>
+          <a:bodyPr rtlCol="0" anchor="ctr"/>
+          <a:lstStyle/>
+          <a:p>
+            <a:pPr algn="ctr"/>
+            <a:endParaRPr lang="en-CO"/>
+          </a:p>
+        </p:txBody>
+      </p:sp>
       <p:pic>
         <p:nvPicPr>
           <p:cNvPr id="1036" name="Picture 12" descr="SOFTWARE PARA EQUIPOS DE PLC HIM SOPORTE Y SERVICIO: ROCKWELL AUTOMATION STUDIO  5000 LOGIX DESIGNER TODAS LAS VERSIONES">
@@ -27093,8 +27302,8 @@
         </p:blipFill>
         <p:spPr bwMode="auto">
           <a:xfrm>
-            <a:off x="4614088" y="294623"/>
-            <a:ext cx="1219818" cy="459013"/>
+            <a:off x="438325" y="354252"/>
+            <a:ext cx="1121566" cy="422041"/>
           </a:xfrm>
           <a:prstGeom prst="rect">
             <a:avLst/>
@@ -27140,7 +27349,7 @@
         </p:blipFill>
         <p:spPr bwMode="auto">
           <a:xfrm>
-            <a:off x="4704761" y="1017863"/>
+            <a:off x="1998097" y="404185"/>
             <a:ext cx="1161336" cy="387112"/>
           </a:xfrm>
           <a:prstGeom prst="rect">
@@ -27158,12 +27367,167 @@
           </a:extLst>
         </p:spPr>
       </p:pic>
+      <p:cxnSp>
+        <p:nvCxnSpPr>
+          <p:cNvPr id="55" name="Elbow Connector 54">
+            <a:extLst>
+              <a:ext uri="{FF2B5EF4-FFF2-40B4-BE49-F238E27FC236}">
+                <a16:creationId xmlns:a16="http://schemas.microsoft.com/office/drawing/2014/main" id="{71F82E4B-AC74-92C2-D111-38B204C6E228}"/>
+              </a:ext>
+            </a:extLst>
+          </p:cNvPr>
+          <p:cNvCxnSpPr>
+            <a:cxnSpLocks/>
+          </p:cNvCxnSpPr>
+          <p:nvPr/>
+        </p:nvCxnSpPr>
+        <p:spPr>
+          <a:xfrm rot="10800000" flipV="1">
+            <a:off x="2495459" y="1021717"/>
+            <a:ext cx="849502" cy="648959"/>
+          </a:xfrm>
+          <a:prstGeom prst="bentConnector3">
+            <a:avLst>
+              <a:gd name="adj1" fmla="val 1640"/>
+            </a:avLst>
+          </a:prstGeom>
+          <a:ln w="38100">
+            <a:tailEnd type="triangle"/>
+          </a:ln>
+        </p:spPr>
+        <p:style>
+          <a:lnRef idx="1">
+            <a:schemeClr val="accent1"/>
+          </a:lnRef>
+          <a:fillRef idx="0">
+            <a:schemeClr val="accent1"/>
+          </a:fillRef>
+          <a:effectRef idx="0">
+            <a:schemeClr val="accent1"/>
+          </a:effectRef>
+          <a:fontRef idx="minor">
+            <a:schemeClr val="tx1"/>
+          </a:fontRef>
+        </p:style>
+      </p:cxnSp>
+      <p:sp>
+        <p:nvSpPr>
+          <p:cNvPr id="1025" name="TextBox 1024">
+            <a:extLst>
+              <a:ext uri="{FF2B5EF4-FFF2-40B4-BE49-F238E27FC236}">
+                <a16:creationId xmlns:a16="http://schemas.microsoft.com/office/drawing/2014/main" id="{1D4B23AC-A16B-E9C7-FDC4-C4C2AB768E36}"/>
+              </a:ext>
+            </a:extLst>
+          </p:cNvPr>
+          <p:cNvSpPr txBox="1"/>
+          <p:nvPr/>
+        </p:nvSpPr>
+        <p:spPr>
+          <a:xfrm>
+            <a:off x="2494110" y="1657425"/>
+            <a:ext cx="907364" cy="369332"/>
+          </a:xfrm>
+          <a:prstGeom prst="rect">
+            <a:avLst/>
+          </a:prstGeom>
+          <a:noFill/>
+        </p:spPr>
+        <p:txBody>
+          <a:bodyPr wrap="none" rtlCol="0">
+            <a:spAutoFit/>
+          </a:bodyPr>
+          <a:lstStyle/>
+          <a:p>
+            <a:r>
+              <a:rPr lang="en-CO" dirty="0"/>
+              <a:t>OPC UA</a:t>
+            </a:r>
+          </a:p>
+        </p:txBody>
+      </p:sp>
+      <p:cxnSp>
+        <p:nvCxnSpPr>
+          <p:cNvPr id="1029" name="Elbow Connector 1028">
+            <a:extLst>
+              <a:ext uri="{FF2B5EF4-FFF2-40B4-BE49-F238E27FC236}">
+                <a16:creationId xmlns:a16="http://schemas.microsoft.com/office/drawing/2014/main" id="{1F610CEF-7568-FE51-EC16-9E610C99F5A4}"/>
+              </a:ext>
+            </a:extLst>
+          </p:cNvPr>
+          <p:cNvCxnSpPr>
+            <a:cxnSpLocks/>
+            <a:stCxn id="1034" idx="1"/>
+          </p:cNvCxnSpPr>
+          <p:nvPr/>
+        </p:nvCxnSpPr>
+        <p:spPr>
+          <a:xfrm rot="10800000" flipV="1">
+            <a:off x="1429173" y="1613864"/>
+            <a:ext cx="458766" cy="880089"/>
+          </a:xfrm>
+          <a:prstGeom prst="bentConnector2">
+            <a:avLst/>
+          </a:prstGeom>
+          <a:ln w="38100">
+            <a:tailEnd type="triangle"/>
+          </a:ln>
+        </p:spPr>
+        <p:style>
+          <a:lnRef idx="1">
+            <a:schemeClr val="accent1"/>
+          </a:lnRef>
+          <a:fillRef idx="0">
+            <a:schemeClr val="accent1"/>
+          </a:fillRef>
+          <a:effectRef idx="0">
+            <a:schemeClr val="accent1"/>
+          </a:effectRef>
+          <a:fontRef idx="minor">
+            <a:schemeClr val="tx1"/>
+          </a:fontRef>
+        </p:style>
+      </p:cxnSp>
+      <p:sp>
+        <p:nvSpPr>
+          <p:cNvPr id="1050" name="TextBox 1049">
+            <a:extLst>
+              <a:ext uri="{FF2B5EF4-FFF2-40B4-BE49-F238E27FC236}">
+                <a16:creationId xmlns:a16="http://schemas.microsoft.com/office/drawing/2014/main" id="{E261F385-091F-4C83-C19C-49D9589EEA07}"/>
+              </a:ext>
+            </a:extLst>
+          </p:cNvPr>
+          <p:cNvSpPr txBox="1"/>
+          <p:nvPr/>
+        </p:nvSpPr>
+        <p:spPr>
+          <a:xfrm>
+            <a:off x="1228214" y="1281422"/>
+            <a:ext cx="759567" cy="369332"/>
+          </a:xfrm>
+          <a:prstGeom prst="rect">
+            <a:avLst/>
+          </a:prstGeom>
+          <a:noFill/>
+        </p:spPr>
+        <p:txBody>
+          <a:bodyPr wrap="none" rtlCol="0">
+            <a:spAutoFit/>
+          </a:bodyPr>
+          <a:lstStyle/>
+          <a:p>
+            <a:r>
+              <a:rPr lang="en-CO" dirty="0"/>
+              <a:t>MQTT</a:t>
+            </a:r>
+          </a:p>
+        </p:txBody>
+      </p:sp>
       <p:pic>
         <p:nvPicPr>
-          <p:cNvPr id="1040" name="Picture 16" descr="Icon for ABB RobotStudio · Issue #1870 · simple-icons/simple-icons · GitHub">
+          <p:cNvPr id="1053" name="Picture 18">
             <a:extLst>
               <a:ext uri="{FF2B5EF4-FFF2-40B4-BE49-F238E27FC236}">
-                <a16:creationId xmlns:a16="http://schemas.microsoft.com/office/drawing/2014/main" id="{55072DB8-7E75-3908-112D-A9B1A9763434}"/>
+                <a16:creationId xmlns:a16="http://schemas.microsoft.com/office/drawing/2014/main" id="{DA9F9083-55FB-CB84-528D-C77A6C7CD523}"/>
               </a:ext>
             </a:extLst>
           </p:cNvPr>
@@ -27187,13 +27551,18 @@
         </p:blipFill>
         <p:spPr bwMode="auto">
           <a:xfrm>
-            <a:off x="4602699" y="1445205"/>
-            <a:ext cx="479486" cy="479486"/>
+            <a:off x="1872354" y="3208361"/>
+            <a:ext cx="483068" cy="483068"/>
           </a:xfrm>
           <a:prstGeom prst="rect">
             <a:avLst/>
           </a:prstGeom>
           <a:noFill/>
+          <a:ln>
+            <a:solidFill>
+              <a:schemeClr val="tx1"/>
+            </a:solidFill>
+          </a:ln>
           <a:extLst>
             <a:ext uri="{909E8E84-426E-40DD-AFC4-6F175D3DCCD1}">
               <a14:hiddenFill xmlns:a14="http://schemas.microsoft.com/office/drawing/2010/main">
@@ -27205,6 +27574,250 @@
           </a:extLst>
         </p:spPr>
       </p:pic>
+      <p:cxnSp>
+        <p:nvCxnSpPr>
+          <p:cNvPr id="1062" name="Straight Arrow Connector 1061">
+            <a:extLst>
+              <a:ext uri="{FF2B5EF4-FFF2-40B4-BE49-F238E27FC236}">
+                <a16:creationId xmlns:a16="http://schemas.microsoft.com/office/drawing/2014/main" id="{246C5E76-69D8-816C-7D23-1066FC240ADC}"/>
+              </a:ext>
+            </a:extLst>
+          </p:cNvPr>
+          <p:cNvCxnSpPr>
+            <a:cxnSpLocks/>
+            <a:endCxn id="11" idx="2"/>
+          </p:cNvCxnSpPr>
+          <p:nvPr/>
+        </p:nvCxnSpPr>
+        <p:spPr>
+          <a:xfrm flipV="1">
+            <a:off x="1493285" y="4870583"/>
+            <a:ext cx="0" cy="875150"/>
+          </a:xfrm>
+          <a:prstGeom prst="straightConnector1">
+            <a:avLst/>
+          </a:prstGeom>
+          <a:ln w="38100">
+            <a:tailEnd type="triangle"/>
+          </a:ln>
+        </p:spPr>
+        <p:style>
+          <a:lnRef idx="1">
+            <a:schemeClr val="accent1"/>
+          </a:lnRef>
+          <a:fillRef idx="0">
+            <a:schemeClr val="accent1"/>
+          </a:fillRef>
+          <a:effectRef idx="0">
+            <a:schemeClr val="accent1"/>
+          </a:effectRef>
+          <a:fontRef idx="minor">
+            <a:schemeClr val="tx1"/>
+          </a:fontRef>
+        </p:style>
+      </p:cxnSp>
+      <p:cxnSp>
+        <p:nvCxnSpPr>
+          <p:cNvPr id="1066" name="Straight Arrow Connector 1065">
+            <a:extLst>
+              <a:ext uri="{FF2B5EF4-FFF2-40B4-BE49-F238E27FC236}">
+                <a16:creationId xmlns:a16="http://schemas.microsoft.com/office/drawing/2014/main" id="{CEDC907A-620D-C2B5-B2D1-B43E011C60CD}"/>
+              </a:ext>
+            </a:extLst>
+          </p:cNvPr>
+          <p:cNvCxnSpPr>
+            <a:cxnSpLocks/>
+            <a:endCxn id="3" idx="3"/>
+          </p:cNvCxnSpPr>
+          <p:nvPr/>
+        </p:nvCxnSpPr>
+        <p:spPr>
+          <a:xfrm flipH="1">
+            <a:off x="1968054" y="6110616"/>
+            <a:ext cx="979738" cy="1"/>
+          </a:xfrm>
+          <a:prstGeom prst="straightConnector1">
+            <a:avLst/>
+          </a:prstGeom>
+          <a:ln w="38100">
+            <a:tailEnd type="triangle"/>
+          </a:ln>
+        </p:spPr>
+        <p:style>
+          <a:lnRef idx="1">
+            <a:schemeClr val="accent1"/>
+          </a:lnRef>
+          <a:fillRef idx="0">
+            <a:schemeClr val="accent1"/>
+          </a:fillRef>
+          <a:effectRef idx="0">
+            <a:schemeClr val="accent1"/>
+          </a:effectRef>
+          <a:fontRef idx="minor">
+            <a:schemeClr val="tx1"/>
+          </a:fontRef>
+        </p:style>
+      </p:cxnSp>
+      <p:sp>
+        <p:nvSpPr>
+          <p:cNvPr id="1069" name="TextBox 1068">
+            <a:extLst>
+              <a:ext uri="{FF2B5EF4-FFF2-40B4-BE49-F238E27FC236}">
+                <a16:creationId xmlns:a16="http://schemas.microsoft.com/office/drawing/2014/main" id="{39F88BCC-3D85-A9A6-4BB5-9EF676055457}"/>
+              </a:ext>
+            </a:extLst>
+          </p:cNvPr>
+          <p:cNvSpPr txBox="1"/>
+          <p:nvPr/>
+        </p:nvSpPr>
+        <p:spPr>
+          <a:xfrm>
+            <a:off x="2075829" y="5778462"/>
+            <a:ext cx="907364" cy="369332"/>
+          </a:xfrm>
+          <a:prstGeom prst="rect">
+            <a:avLst/>
+          </a:prstGeom>
+          <a:noFill/>
+        </p:spPr>
+        <p:txBody>
+          <a:bodyPr wrap="none" rtlCol="0">
+            <a:spAutoFit/>
+          </a:bodyPr>
+          <a:lstStyle/>
+          <a:p>
+            <a:r>
+              <a:rPr lang="en-CO" dirty="0"/>
+              <a:t>OPC UA</a:t>
+            </a:r>
+          </a:p>
+        </p:txBody>
+      </p:sp>
+      <p:sp>
+        <p:nvSpPr>
+          <p:cNvPr id="1070" name="TextBox 1069">
+            <a:extLst>
+              <a:ext uri="{FF2B5EF4-FFF2-40B4-BE49-F238E27FC236}">
+                <a16:creationId xmlns:a16="http://schemas.microsoft.com/office/drawing/2014/main" id="{0FEDF0C8-F71F-370F-35DC-625402FCB470}"/>
+              </a:ext>
+            </a:extLst>
+          </p:cNvPr>
+          <p:cNvSpPr txBox="1"/>
+          <p:nvPr/>
+        </p:nvSpPr>
+        <p:spPr>
+          <a:xfrm>
+            <a:off x="742523" y="5369840"/>
+            <a:ext cx="759567" cy="369332"/>
+          </a:xfrm>
+          <a:prstGeom prst="rect">
+            <a:avLst/>
+          </a:prstGeom>
+          <a:noFill/>
+        </p:spPr>
+        <p:txBody>
+          <a:bodyPr wrap="none" rtlCol="0">
+            <a:spAutoFit/>
+          </a:bodyPr>
+          <a:lstStyle/>
+          <a:p>
+            <a:r>
+              <a:rPr lang="en-CO" dirty="0"/>
+              <a:t>MQTT</a:t>
+            </a:r>
+          </a:p>
+        </p:txBody>
+      </p:sp>
+      <p:sp>
+        <p:nvSpPr>
+          <p:cNvPr id="1071" name="Rounded Rectangle 1070">
+            <a:extLst>
+              <a:ext uri="{FF2B5EF4-FFF2-40B4-BE49-F238E27FC236}">
+                <a16:creationId xmlns:a16="http://schemas.microsoft.com/office/drawing/2014/main" id="{4E3475B7-A7D5-184D-8A13-14C2B2409862}"/>
+              </a:ext>
+            </a:extLst>
+          </p:cNvPr>
+          <p:cNvSpPr/>
+          <p:nvPr/>
+        </p:nvSpPr>
+        <p:spPr>
+          <a:xfrm>
+            <a:off x="4145902" y="1390072"/>
+            <a:ext cx="2267065" cy="5344980"/>
+          </a:xfrm>
+          <a:prstGeom prst="roundRect">
+            <a:avLst>
+              <a:gd name="adj" fmla="val 7472"/>
+            </a:avLst>
+          </a:prstGeom>
+          <a:solidFill>
+            <a:schemeClr val="accent3">
+              <a:lumMod val="20000"/>
+              <a:lumOff val="80000"/>
+              <a:alpha val="81876"/>
+            </a:schemeClr>
+          </a:solidFill>
+        </p:spPr>
+        <p:style>
+          <a:lnRef idx="2">
+            <a:schemeClr val="accent1">
+              <a:shade val="50000"/>
+            </a:schemeClr>
+          </a:lnRef>
+          <a:fillRef idx="1">
+            <a:schemeClr val="accent1"/>
+          </a:fillRef>
+          <a:effectRef idx="0">
+            <a:schemeClr val="accent1"/>
+          </a:effectRef>
+          <a:fontRef idx="minor">
+            <a:schemeClr val="lt1"/>
+          </a:fontRef>
+        </p:style>
+        <p:txBody>
+          <a:bodyPr rtlCol="0" anchor="ctr"/>
+          <a:lstStyle/>
+          <a:p>
+            <a:pPr algn="ctr"/>
+            <a:endParaRPr lang="en-CO"/>
+          </a:p>
+        </p:txBody>
+      </p:sp>
+      <p:sp>
+        <p:nvSpPr>
+          <p:cNvPr id="1072" name="TextBox 1071">
+            <a:extLst>
+              <a:ext uri="{FF2B5EF4-FFF2-40B4-BE49-F238E27FC236}">
+                <a16:creationId xmlns:a16="http://schemas.microsoft.com/office/drawing/2014/main" id="{A6F6F925-7115-958B-C43D-600B33AEA613}"/>
+              </a:ext>
+            </a:extLst>
+          </p:cNvPr>
+          <p:cNvSpPr txBox="1"/>
+          <p:nvPr/>
+        </p:nvSpPr>
+        <p:spPr>
+          <a:xfrm>
+            <a:off x="4310741" y="6355668"/>
+            <a:ext cx="1665712" cy="369332"/>
+          </a:xfrm>
+          <a:prstGeom prst="rect">
+            <a:avLst/>
+          </a:prstGeom>
+          <a:noFill/>
+        </p:spPr>
+        <p:txBody>
+          <a:bodyPr wrap="none" rtlCol="0">
+            <a:spAutoFit/>
+          </a:bodyPr>
+          <a:lstStyle/>
+          <a:p>
+            <a:r>
+              <a:rPr lang="en-CO" dirty="0"/>
+              <a:t>Public Network</a:t>
+            </a:r>
+          </a:p>
+        </p:txBody>
+      </p:sp>
       <p:pic>
         <p:nvPicPr>
           <p:cNvPr id="14" name="Picture 4">
@@ -27234,8 +27847,8 @@
         </p:blipFill>
         <p:spPr bwMode="auto">
           <a:xfrm>
-            <a:off x="8279385" y="5311220"/>
-            <a:ext cx="722689" cy="722689"/>
+            <a:off x="4474256" y="295597"/>
+            <a:ext cx="520553" cy="520553"/>
           </a:xfrm>
           <a:prstGeom prst="rect">
             <a:avLst/>
@@ -27252,839 +27865,59 @@
           </a:extLst>
         </p:spPr>
       </p:pic>
-      <p:grpSp>
-        <p:nvGrpSpPr>
-          <p:cNvPr id="16" name="Group 15">
+      <p:sp>
+        <p:nvSpPr>
+          <p:cNvPr id="1047" name="TextBox 1046">
             <a:extLst>
               <a:ext uri="{FF2B5EF4-FFF2-40B4-BE49-F238E27FC236}">
-                <a16:creationId xmlns:a16="http://schemas.microsoft.com/office/drawing/2014/main" id="{8BCAF2B2-C374-647B-3F0E-CA2DEC643FC4}"/>
+                <a16:creationId xmlns:a16="http://schemas.microsoft.com/office/drawing/2014/main" id="{40FD059F-D660-B47A-823F-98970585DC8A}"/>
               </a:ext>
             </a:extLst>
           </p:cNvPr>
-          <p:cNvGrpSpPr/>
+          <p:cNvSpPr txBox="1"/>
           <p:nvPr/>
-        </p:nvGrpSpPr>
-        <p:grpSpPr>
-          <a:xfrm>
-            <a:off x="2180348" y="3618531"/>
-            <a:ext cx="939681" cy="728061"/>
-            <a:chOff x="3039537" y="2345329"/>
-            <a:chExt cx="939681" cy="728061"/>
-          </a:xfrm>
-        </p:grpSpPr>
-        <p:pic>
-          <p:nvPicPr>
-            <p:cNvPr id="1042" name="Picture 18">
-              <a:extLst>
-                <a:ext uri="{FF2B5EF4-FFF2-40B4-BE49-F238E27FC236}">
-                  <a16:creationId xmlns:a16="http://schemas.microsoft.com/office/drawing/2014/main" id="{062ADA14-AF02-7251-9230-34B53A4360E3}"/>
-                </a:ext>
-              </a:extLst>
-            </p:cNvPr>
-            <p:cNvPicPr>
-              <a:picLocks noChangeAspect="1" noChangeArrowheads="1"/>
-            </p:cNvPicPr>
-            <p:nvPr/>
-          </p:nvPicPr>
-          <p:blipFill>
-            <a:blip r:embed="rId11">
-              <a:extLst>
-                <a:ext uri="{28A0092B-C50C-407E-A947-70E740481C1C}">
-                  <a14:useLocalDpi xmlns:a14="http://schemas.microsoft.com/office/drawing/2010/main" val="0"/>
-                </a:ext>
-              </a:extLst>
-            </a:blip>
-            <a:srcRect/>
-            <a:stretch>
-              <a:fillRect/>
-            </a:stretch>
-          </p:blipFill>
-          <p:spPr bwMode="auto">
-            <a:xfrm>
-              <a:off x="3279158" y="2345329"/>
-              <a:ext cx="483068" cy="483068"/>
-            </a:xfrm>
-            <a:prstGeom prst="rect">
-              <a:avLst/>
-            </a:prstGeom>
-            <a:noFill/>
-            <a:extLst>
-              <a:ext uri="{909E8E84-426E-40DD-AFC4-6F175D3DCCD1}">
-                <a14:hiddenFill xmlns:a14="http://schemas.microsoft.com/office/drawing/2010/main">
-                  <a:solidFill>
-                    <a:srgbClr val="FFFFFF"/>
-                  </a:solidFill>
-                </a14:hiddenFill>
-              </a:ext>
-            </a:extLst>
-          </p:spPr>
-        </p:pic>
-        <p:sp>
-          <p:nvSpPr>
-            <p:cNvPr id="15" name="TextBox 14">
-              <a:extLst>
-                <a:ext uri="{FF2B5EF4-FFF2-40B4-BE49-F238E27FC236}">
-                  <a16:creationId xmlns:a16="http://schemas.microsoft.com/office/drawing/2014/main" id="{E879D341-455A-7124-E2DE-7BC2BD085059}"/>
-                </a:ext>
-              </a:extLst>
-            </p:cNvPr>
-            <p:cNvSpPr txBox="1"/>
-            <p:nvPr/>
-          </p:nvSpPr>
-          <p:spPr>
-            <a:xfrm>
-              <a:off x="3039537" y="2811780"/>
-              <a:ext cx="939681" cy="261610"/>
-            </a:xfrm>
-            <a:prstGeom prst="rect">
-              <a:avLst/>
-            </a:prstGeom>
-            <a:noFill/>
-          </p:spPr>
-          <p:txBody>
-            <a:bodyPr wrap="none" rtlCol="0">
-              <a:spAutoFit/>
-            </a:bodyPr>
-            <a:lstStyle/>
-            <a:p>
-              <a:r>
-                <a:rPr lang="en-CO" sz="1100" dirty="0"/>
-                <a:t>10.203.3.253</a:t>
-              </a:r>
-            </a:p>
-          </p:txBody>
-        </p:sp>
-      </p:grpSp>
-      <p:grpSp>
-        <p:nvGrpSpPr>
-          <p:cNvPr id="17" name="Group 16">
-            <a:extLst>
-              <a:ext uri="{FF2B5EF4-FFF2-40B4-BE49-F238E27FC236}">
-                <a16:creationId xmlns:a16="http://schemas.microsoft.com/office/drawing/2014/main" id="{19131A6A-82F8-FCEC-67F6-3FA515867424}"/>
-              </a:ext>
-            </a:extLst>
-          </p:cNvPr>
-          <p:cNvGrpSpPr/>
-          <p:nvPr/>
-        </p:nvGrpSpPr>
-        <p:grpSpPr>
-          <a:xfrm>
-            <a:off x="4281437" y="3618531"/>
-            <a:ext cx="939681" cy="728061"/>
-            <a:chOff x="3039537" y="2345329"/>
-            <a:chExt cx="939681" cy="728061"/>
-          </a:xfrm>
-        </p:grpSpPr>
-        <p:pic>
-          <p:nvPicPr>
-            <p:cNvPr id="18" name="Picture 18">
-              <a:extLst>
-                <a:ext uri="{FF2B5EF4-FFF2-40B4-BE49-F238E27FC236}">
-                  <a16:creationId xmlns:a16="http://schemas.microsoft.com/office/drawing/2014/main" id="{2912D40B-5865-6643-29A7-1085881E0C0E}"/>
-                </a:ext>
-              </a:extLst>
-            </p:cNvPr>
-            <p:cNvPicPr>
-              <a:picLocks noChangeAspect="1" noChangeArrowheads="1"/>
-            </p:cNvPicPr>
-            <p:nvPr/>
-          </p:nvPicPr>
-          <p:blipFill>
-            <a:blip r:embed="rId11">
-              <a:extLst>
-                <a:ext uri="{28A0092B-C50C-407E-A947-70E740481C1C}">
-                  <a14:useLocalDpi xmlns:a14="http://schemas.microsoft.com/office/drawing/2010/main" val="0"/>
-                </a:ext>
-              </a:extLst>
-            </a:blip>
-            <a:srcRect/>
-            <a:stretch>
-              <a:fillRect/>
-            </a:stretch>
-          </p:blipFill>
-          <p:spPr bwMode="auto">
-            <a:xfrm>
-              <a:off x="3279158" y="2345329"/>
-              <a:ext cx="483068" cy="483068"/>
-            </a:xfrm>
-            <a:prstGeom prst="rect">
-              <a:avLst/>
-            </a:prstGeom>
-            <a:noFill/>
-            <a:extLst>
-              <a:ext uri="{909E8E84-426E-40DD-AFC4-6F175D3DCCD1}">
-                <a14:hiddenFill xmlns:a14="http://schemas.microsoft.com/office/drawing/2010/main">
-                  <a:solidFill>
-                    <a:srgbClr val="FFFFFF"/>
-                  </a:solidFill>
-                </a14:hiddenFill>
-              </a:ext>
-            </a:extLst>
-          </p:spPr>
-        </p:pic>
-        <p:sp>
-          <p:nvSpPr>
-            <p:cNvPr id="19" name="TextBox 18">
-              <a:extLst>
-                <a:ext uri="{FF2B5EF4-FFF2-40B4-BE49-F238E27FC236}">
-                  <a16:creationId xmlns:a16="http://schemas.microsoft.com/office/drawing/2014/main" id="{A2A07BD9-B94F-CEC8-1BC0-66028590F606}"/>
-                </a:ext>
-              </a:extLst>
-            </p:cNvPr>
-            <p:cNvSpPr txBox="1"/>
-            <p:nvPr/>
-          </p:nvSpPr>
-          <p:spPr>
-            <a:xfrm>
-              <a:off x="3039537" y="2811780"/>
-              <a:ext cx="939681" cy="261610"/>
-            </a:xfrm>
-            <a:prstGeom prst="rect">
-              <a:avLst/>
-            </a:prstGeom>
-            <a:noFill/>
-          </p:spPr>
-          <p:txBody>
-            <a:bodyPr wrap="none" rtlCol="0">
-              <a:spAutoFit/>
-            </a:bodyPr>
-            <a:lstStyle/>
-            <a:p>
-              <a:r>
-                <a:rPr lang="en-CO" sz="1100" dirty="0"/>
-                <a:t>10.203.3.250</a:t>
-              </a:r>
-            </a:p>
-          </p:txBody>
-        </p:sp>
-      </p:grpSp>
-      <p:grpSp>
-        <p:nvGrpSpPr>
-          <p:cNvPr id="20" name="Group 19">
-            <a:extLst>
-              <a:ext uri="{FF2B5EF4-FFF2-40B4-BE49-F238E27FC236}">
-                <a16:creationId xmlns:a16="http://schemas.microsoft.com/office/drawing/2014/main" id="{458E242A-B47F-F6E7-51C3-8AB3120E73FF}"/>
-              </a:ext>
-            </a:extLst>
-          </p:cNvPr>
-          <p:cNvGrpSpPr/>
-          <p:nvPr/>
-        </p:nvGrpSpPr>
-        <p:grpSpPr>
-          <a:xfrm>
-            <a:off x="4842564" y="2786459"/>
-            <a:ext cx="939681" cy="728061"/>
-            <a:chOff x="3039537" y="2345329"/>
-            <a:chExt cx="939681" cy="728061"/>
-          </a:xfrm>
-        </p:grpSpPr>
-        <p:pic>
-          <p:nvPicPr>
-            <p:cNvPr id="21" name="Picture 18">
-              <a:extLst>
-                <a:ext uri="{FF2B5EF4-FFF2-40B4-BE49-F238E27FC236}">
-                  <a16:creationId xmlns:a16="http://schemas.microsoft.com/office/drawing/2014/main" id="{12E6B7DD-6B6E-12DE-CF34-53E9A5A0B71B}"/>
-                </a:ext>
-              </a:extLst>
-            </p:cNvPr>
-            <p:cNvPicPr>
-              <a:picLocks noChangeAspect="1" noChangeArrowheads="1"/>
-            </p:cNvPicPr>
-            <p:nvPr/>
-          </p:nvPicPr>
-          <p:blipFill>
-            <a:blip r:embed="rId11">
-              <a:extLst>
-                <a:ext uri="{28A0092B-C50C-407E-A947-70E740481C1C}">
-                  <a14:useLocalDpi xmlns:a14="http://schemas.microsoft.com/office/drawing/2010/main" val="0"/>
-                </a:ext>
-              </a:extLst>
-            </a:blip>
-            <a:srcRect/>
-            <a:stretch>
-              <a:fillRect/>
-            </a:stretch>
-          </p:blipFill>
-          <p:spPr bwMode="auto">
-            <a:xfrm>
-              <a:off x="3279158" y="2345329"/>
-              <a:ext cx="483068" cy="483068"/>
-            </a:xfrm>
-            <a:prstGeom prst="rect">
-              <a:avLst/>
-            </a:prstGeom>
-            <a:noFill/>
-            <a:extLst>
-              <a:ext uri="{909E8E84-426E-40DD-AFC4-6F175D3DCCD1}">
-                <a14:hiddenFill xmlns:a14="http://schemas.microsoft.com/office/drawing/2010/main">
-                  <a:solidFill>
-                    <a:srgbClr val="FFFFFF"/>
-                  </a:solidFill>
-                </a14:hiddenFill>
-              </a:ext>
-            </a:extLst>
-          </p:spPr>
-        </p:pic>
-        <p:sp>
-          <p:nvSpPr>
-            <p:cNvPr id="22" name="TextBox 21">
-              <a:extLst>
-                <a:ext uri="{FF2B5EF4-FFF2-40B4-BE49-F238E27FC236}">
-                  <a16:creationId xmlns:a16="http://schemas.microsoft.com/office/drawing/2014/main" id="{85E1C57E-611B-6C44-C009-3977CDD9C598}"/>
-                </a:ext>
-              </a:extLst>
-            </p:cNvPr>
-            <p:cNvSpPr txBox="1"/>
-            <p:nvPr/>
-          </p:nvSpPr>
-          <p:spPr>
-            <a:xfrm>
-              <a:off x="3039537" y="2811780"/>
-              <a:ext cx="939681" cy="261610"/>
-            </a:xfrm>
-            <a:prstGeom prst="rect">
-              <a:avLst/>
-            </a:prstGeom>
-            <a:noFill/>
-          </p:spPr>
-          <p:txBody>
-            <a:bodyPr wrap="none" rtlCol="0">
-              <a:spAutoFit/>
-            </a:bodyPr>
-            <a:lstStyle/>
-            <a:p>
-              <a:r>
-                <a:rPr lang="en-CO" sz="1100" dirty="0"/>
-                <a:t>10.203.3.249</a:t>
-              </a:r>
-            </a:p>
-          </p:txBody>
-        </p:sp>
-      </p:grpSp>
-      <p:grpSp>
-        <p:nvGrpSpPr>
-          <p:cNvPr id="23" name="Group 22">
-            <a:extLst>
-              <a:ext uri="{FF2B5EF4-FFF2-40B4-BE49-F238E27FC236}">
-                <a16:creationId xmlns:a16="http://schemas.microsoft.com/office/drawing/2014/main" id="{140834DC-FE8B-3A00-0DEC-3CB4DCEF4B25}"/>
-              </a:ext>
-            </a:extLst>
-          </p:cNvPr>
-          <p:cNvGrpSpPr/>
-          <p:nvPr/>
-        </p:nvGrpSpPr>
-        <p:grpSpPr>
-          <a:xfrm>
-            <a:off x="3750656" y="2780661"/>
-            <a:ext cx="939681" cy="728061"/>
-            <a:chOff x="3039537" y="2345329"/>
-            <a:chExt cx="939681" cy="728061"/>
-          </a:xfrm>
-        </p:grpSpPr>
-        <p:pic>
-          <p:nvPicPr>
-            <p:cNvPr id="24" name="Picture 18">
-              <a:extLst>
-                <a:ext uri="{FF2B5EF4-FFF2-40B4-BE49-F238E27FC236}">
-                  <a16:creationId xmlns:a16="http://schemas.microsoft.com/office/drawing/2014/main" id="{4FDCCFB1-48C5-34C6-AE0C-678013911804}"/>
-                </a:ext>
-              </a:extLst>
-            </p:cNvPr>
-            <p:cNvPicPr>
-              <a:picLocks noChangeAspect="1" noChangeArrowheads="1"/>
-            </p:cNvPicPr>
-            <p:nvPr/>
-          </p:nvPicPr>
-          <p:blipFill>
-            <a:blip r:embed="rId11">
-              <a:extLst>
-                <a:ext uri="{28A0092B-C50C-407E-A947-70E740481C1C}">
-                  <a14:useLocalDpi xmlns:a14="http://schemas.microsoft.com/office/drawing/2010/main" val="0"/>
-                </a:ext>
-              </a:extLst>
-            </a:blip>
-            <a:srcRect/>
-            <a:stretch>
-              <a:fillRect/>
-            </a:stretch>
-          </p:blipFill>
-          <p:spPr bwMode="auto">
-            <a:xfrm>
-              <a:off x="3279158" y="2345329"/>
-              <a:ext cx="483068" cy="483068"/>
-            </a:xfrm>
-            <a:prstGeom prst="rect">
-              <a:avLst/>
-            </a:prstGeom>
-            <a:noFill/>
-            <a:extLst>
-              <a:ext uri="{909E8E84-426E-40DD-AFC4-6F175D3DCCD1}">
-                <a14:hiddenFill xmlns:a14="http://schemas.microsoft.com/office/drawing/2010/main">
-                  <a:solidFill>
-                    <a:srgbClr val="FFFFFF"/>
-                  </a:solidFill>
-                </a14:hiddenFill>
-              </a:ext>
-            </a:extLst>
-          </p:spPr>
-        </p:pic>
-        <p:sp>
-          <p:nvSpPr>
-            <p:cNvPr id="25" name="TextBox 24">
-              <a:extLst>
-                <a:ext uri="{FF2B5EF4-FFF2-40B4-BE49-F238E27FC236}">
-                  <a16:creationId xmlns:a16="http://schemas.microsoft.com/office/drawing/2014/main" id="{08D8697E-5C03-C190-939D-CC266A97704F}"/>
-                </a:ext>
-              </a:extLst>
-            </p:cNvPr>
-            <p:cNvSpPr txBox="1"/>
-            <p:nvPr/>
-          </p:nvSpPr>
-          <p:spPr>
-            <a:xfrm>
-              <a:off x="3039537" y="2811780"/>
-              <a:ext cx="939681" cy="261610"/>
-            </a:xfrm>
-            <a:prstGeom prst="rect">
-              <a:avLst/>
-            </a:prstGeom>
-            <a:noFill/>
-          </p:spPr>
-          <p:txBody>
-            <a:bodyPr wrap="none" rtlCol="0">
-              <a:spAutoFit/>
-            </a:bodyPr>
-            <a:lstStyle/>
-            <a:p>
-              <a:r>
-                <a:rPr lang="en-CO" sz="1100" dirty="0"/>
-                <a:t>10.203.3.248</a:t>
-              </a:r>
-            </a:p>
-          </p:txBody>
-        </p:sp>
-      </p:grpSp>
-      <p:grpSp>
-        <p:nvGrpSpPr>
-          <p:cNvPr id="26" name="Group 25">
-            <a:extLst>
-              <a:ext uri="{FF2B5EF4-FFF2-40B4-BE49-F238E27FC236}">
-                <a16:creationId xmlns:a16="http://schemas.microsoft.com/office/drawing/2014/main" id="{02F950F2-0614-86AB-445C-C608BC055A98}"/>
-              </a:ext>
-            </a:extLst>
-          </p:cNvPr>
-          <p:cNvGrpSpPr/>
-          <p:nvPr/>
-        </p:nvGrpSpPr>
-        <p:grpSpPr>
-          <a:xfrm>
-            <a:off x="2688338" y="2780661"/>
-            <a:ext cx="939681" cy="728061"/>
-            <a:chOff x="3039537" y="2345329"/>
-            <a:chExt cx="939681" cy="728061"/>
-          </a:xfrm>
-        </p:grpSpPr>
-        <p:pic>
-          <p:nvPicPr>
-            <p:cNvPr id="27" name="Picture 18">
-              <a:extLst>
-                <a:ext uri="{FF2B5EF4-FFF2-40B4-BE49-F238E27FC236}">
-                  <a16:creationId xmlns:a16="http://schemas.microsoft.com/office/drawing/2014/main" id="{A7DA3B9B-13B4-48F9-AC3C-996A5F21008E}"/>
-                </a:ext>
-              </a:extLst>
-            </p:cNvPr>
-            <p:cNvPicPr>
-              <a:picLocks noChangeAspect="1" noChangeArrowheads="1"/>
-            </p:cNvPicPr>
-            <p:nvPr/>
-          </p:nvPicPr>
-          <p:blipFill>
-            <a:blip r:embed="rId11">
-              <a:extLst>
-                <a:ext uri="{28A0092B-C50C-407E-A947-70E740481C1C}">
-                  <a14:useLocalDpi xmlns:a14="http://schemas.microsoft.com/office/drawing/2010/main" val="0"/>
-                </a:ext>
-              </a:extLst>
-            </a:blip>
-            <a:srcRect/>
-            <a:stretch>
-              <a:fillRect/>
-            </a:stretch>
-          </p:blipFill>
-          <p:spPr bwMode="auto">
-            <a:xfrm>
-              <a:off x="3279158" y="2345329"/>
-              <a:ext cx="483068" cy="483068"/>
-            </a:xfrm>
-            <a:prstGeom prst="rect">
-              <a:avLst/>
-            </a:prstGeom>
-            <a:noFill/>
-            <a:extLst>
-              <a:ext uri="{909E8E84-426E-40DD-AFC4-6F175D3DCCD1}">
-                <a14:hiddenFill xmlns:a14="http://schemas.microsoft.com/office/drawing/2010/main">
-                  <a:solidFill>
-                    <a:srgbClr val="FFFFFF"/>
-                  </a:solidFill>
-                </a14:hiddenFill>
-              </a:ext>
-            </a:extLst>
-          </p:spPr>
-        </p:pic>
-        <p:sp>
-          <p:nvSpPr>
-            <p:cNvPr id="28" name="TextBox 27">
-              <a:extLst>
-                <a:ext uri="{FF2B5EF4-FFF2-40B4-BE49-F238E27FC236}">
-                  <a16:creationId xmlns:a16="http://schemas.microsoft.com/office/drawing/2014/main" id="{954C8201-49FA-4636-C27B-1C0937BB32BC}"/>
-                </a:ext>
-              </a:extLst>
-            </p:cNvPr>
-            <p:cNvSpPr txBox="1"/>
-            <p:nvPr/>
-          </p:nvSpPr>
-          <p:spPr>
-            <a:xfrm>
-              <a:off x="3039537" y="2811780"/>
-              <a:ext cx="939681" cy="261610"/>
-            </a:xfrm>
-            <a:prstGeom prst="rect">
-              <a:avLst/>
-            </a:prstGeom>
-            <a:noFill/>
-          </p:spPr>
-          <p:txBody>
-            <a:bodyPr wrap="none" rtlCol="0">
-              <a:spAutoFit/>
-            </a:bodyPr>
-            <a:lstStyle/>
-            <a:p>
-              <a:r>
-                <a:rPr lang="en-CO" sz="1100" dirty="0"/>
-                <a:t>10.203.3.247</a:t>
-              </a:r>
-            </a:p>
-          </p:txBody>
-        </p:sp>
-      </p:grpSp>
-      <p:grpSp>
-        <p:nvGrpSpPr>
-          <p:cNvPr id="29" name="Group 28">
-            <a:extLst>
-              <a:ext uri="{FF2B5EF4-FFF2-40B4-BE49-F238E27FC236}">
-                <a16:creationId xmlns:a16="http://schemas.microsoft.com/office/drawing/2014/main" id="{B9EC2A57-2EB5-C206-E7BA-89D595072681}"/>
-              </a:ext>
-            </a:extLst>
-          </p:cNvPr>
-          <p:cNvGrpSpPr/>
-          <p:nvPr/>
-        </p:nvGrpSpPr>
-        <p:grpSpPr>
-          <a:xfrm>
-            <a:off x="1614719" y="2780661"/>
-            <a:ext cx="939681" cy="728061"/>
-            <a:chOff x="3039537" y="2345329"/>
-            <a:chExt cx="939681" cy="728061"/>
-          </a:xfrm>
-        </p:grpSpPr>
-        <p:pic>
-          <p:nvPicPr>
-            <p:cNvPr id="30" name="Picture 18">
-              <a:extLst>
-                <a:ext uri="{FF2B5EF4-FFF2-40B4-BE49-F238E27FC236}">
-                  <a16:creationId xmlns:a16="http://schemas.microsoft.com/office/drawing/2014/main" id="{3D7B9F22-1EA4-8BDC-9BBA-71CD3D83A182}"/>
-                </a:ext>
-              </a:extLst>
-            </p:cNvPr>
-            <p:cNvPicPr>
-              <a:picLocks noChangeAspect="1" noChangeArrowheads="1"/>
-            </p:cNvPicPr>
-            <p:nvPr/>
-          </p:nvPicPr>
-          <p:blipFill>
-            <a:blip r:embed="rId11">
-              <a:extLst>
-                <a:ext uri="{28A0092B-C50C-407E-A947-70E740481C1C}">
-                  <a14:useLocalDpi xmlns:a14="http://schemas.microsoft.com/office/drawing/2010/main" val="0"/>
-                </a:ext>
-              </a:extLst>
-            </a:blip>
-            <a:srcRect/>
-            <a:stretch>
-              <a:fillRect/>
-            </a:stretch>
-          </p:blipFill>
-          <p:spPr bwMode="auto">
-            <a:xfrm>
-              <a:off x="3279158" y="2345329"/>
-              <a:ext cx="483068" cy="483068"/>
-            </a:xfrm>
-            <a:prstGeom prst="rect">
-              <a:avLst/>
-            </a:prstGeom>
-            <a:noFill/>
-            <a:extLst>
-              <a:ext uri="{909E8E84-426E-40DD-AFC4-6F175D3DCCD1}">
-                <a14:hiddenFill xmlns:a14="http://schemas.microsoft.com/office/drawing/2010/main">
-                  <a:solidFill>
-                    <a:srgbClr val="FFFFFF"/>
-                  </a:solidFill>
-                </a14:hiddenFill>
-              </a:ext>
-            </a:extLst>
-          </p:spPr>
-        </p:pic>
-        <p:sp>
-          <p:nvSpPr>
-            <p:cNvPr id="31" name="TextBox 30">
-              <a:extLst>
-                <a:ext uri="{FF2B5EF4-FFF2-40B4-BE49-F238E27FC236}">
-                  <a16:creationId xmlns:a16="http://schemas.microsoft.com/office/drawing/2014/main" id="{6FAD5D95-21F9-DC64-F21F-9DEE705E91A6}"/>
-                </a:ext>
-              </a:extLst>
-            </p:cNvPr>
-            <p:cNvSpPr txBox="1"/>
-            <p:nvPr/>
-          </p:nvSpPr>
-          <p:spPr>
-            <a:xfrm>
-              <a:off x="3039537" y="2811780"/>
-              <a:ext cx="939681" cy="261610"/>
-            </a:xfrm>
-            <a:prstGeom prst="rect">
-              <a:avLst/>
-            </a:prstGeom>
-            <a:noFill/>
-          </p:spPr>
-          <p:txBody>
-            <a:bodyPr wrap="none" rtlCol="0">
-              <a:spAutoFit/>
-            </a:bodyPr>
-            <a:lstStyle/>
-            <a:p>
-              <a:r>
-                <a:rPr lang="en-CO" sz="1100" dirty="0"/>
-                <a:t>10.203.3.246</a:t>
-              </a:r>
-            </a:p>
-          </p:txBody>
-        </p:sp>
-      </p:grpSp>
-      <p:grpSp>
-        <p:nvGrpSpPr>
-          <p:cNvPr id="32" name="Group 31">
-            <a:extLst>
-              <a:ext uri="{FF2B5EF4-FFF2-40B4-BE49-F238E27FC236}">
-                <a16:creationId xmlns:a16="http://schemas.microsoft.com/office/drawing/2014/main" id="{BB841C61-091A-295B-2D7E-DE4BE6413659}"/>
-              </a:ext>
-            </a:extLst>
-          </p:cNvPr>
-          <p:cNvGrpSpPr/>
-          <p:nvPr/>
-        </p:nvGrpSpPr>
-        <p:grpSpPr>
-          <a:xfrm>
-            <a:off x="3226979" y="3618531"/>
-            <a:ext cx="939681" cy="728061"/>
-            <a:chOff x="3039537" y="2345329"/>
-            <a:chExt cx="939681" cy="728061"/>
-          </a:xfrm>
-        </p:grpSpPr>
-        <p:pic>
-          <p:nvPicPr>
-            <p:cNvPr id="33" name="Picture 18">
-              <a:extLst>
-                <a:ext uri="{FF2B5EF4-FFF2-40B4-BE49-F238E27FC236}">
-                  <a16:creationId xmlns:a16="http://schemas.microsoft.com/office/drawing/2014/main" id="{FF63B7CF-B9F4-CA55-7DE4-E772FD4BB674}"/>
-                </a:ext>
-              </a:extLst>
-            </p:cNvPr>
-            <p:cNvPicPr>
-              <a:picLocks noChangeAspect="1" noChangeArrowheads="1"/>
-            </p:cNvPicPr>
-            <p:nvPr/>
-          </p:nvPicPr>
-          <p:blipFill>
-            <a:blip r:embed="rId11">
-              <a:extLst>
-                <a:ext uri="{28A0092B-C50C-407E-A947-70E740481C1C}">
-                  <a14:useLocalDpi xmlns:a14="http://schemas.microsoft.com/office/drawing/2010/main" val="0"/>
-                </a:ext>
-              </a:extLst>
-            </a:blip>
-            <a:srcRect/>
-            <a:stretch>
-              <a:fillRect/>
-            </a:stretch>
-          </p:blipFill>
-          <p:spPr bwMode="auto">
-            <a:xfrm>
-              <a:off x="3279158" y="2345329"/>
-              <a:ext cx="483068" cy="483068"/>
-            </a:xfrm>
-            <a:prstGeom prst="rect">
-              <a:avLst/>
-            </a:prstGeom>
-            <a:noFill/>
-            <a:extLst>
-              <a:ext uri="{909E8E84-426E-40DD-AFC4-6F175D3DCCD1}">
-                <a14:hiddenFill xmlns:a14="http://schemas.microsoft.com/office/drawing/2010/main">
-                  <a:solidFill>
-                    <a:srgbClr val="FFFFFF"/>
-                  </a:solidFill>
-                </a14:hiddenFill>
-              </a:ext>
-            </a:extLst>
-          </p:spPr>
-        </p:pic>
-        <p:sp>
-          <p:nvSpPr>
-            <p:cNvPr id="34" name="TextBox 33">
-              <a:extLst>
-                <a:ext uri="{FF2B5EF4-FFF2-40B4-BE49-F238E27FC236}">
-                  <a16:creationId xmlns:a16="http://schemas.microsoft.com/office/drawing/2014/main" id="{67990CD2-0A2F-1E0D-2ADB-E907AFF5293E}"/>
-                </a:ext>
-              </a:extLst>
-            </p:cNvPr>
-            <p:cNvSpPr txBox="1"/>
-            <p:nvPr/>
-          </p:nvSpPr>
-          <p:spPr>
-            <a:xfrm>
-              <a:off x="3039537" y="2811780"/>
-              <a:ext cx="939681" cy="261610"/>
-            </a:xfrm>
-            <a:prstGeom prst="rect">
-              <a:avLst/>
-            </a:prstGeom>
-            <a:noFill/>
-          </p:spPr>
-          <p:txBody>
-            <a:bodyPr wrap="none" rtlCol="0">
-              <a:spAutoFit/>
-            </a:bodyPr>
-            <a:lstStyle/>
-            <a:p>
-              <a:r>
-                <a:rPr lang="en-CO" sz="1100" dirty="0"/>
-                <a:t>10.203.3.252</a:t>
-              </a:r>
-            </a:p>
-          </p:txBody>
-        </p:sp>
-      </p:grpSp>
-      <p:pic>
-        <p:nvPicPr>
-          <p:cNvPr id="1044" name="Picture 20">
-            <a:extLst>
-              <a:ext uri="{FF2B5EF4-FFF2-40B4-BE49-F238E27FC236}">
-                <a16:creationId xmlns:a16="http://schemas.microsoft.com/office/drawing/2014/main" id="{6864A419-DA47-3282-892A-F1AFAD1D8837}"/>
-              </a:ext>
-            </a:extLst>
-          </p:cNvPr>
-          <p:cNvPicPr>
-            <a:picLocks noChangeAspect="1" noChangeArrowheads="1"/>
-          </p:cNvPicPr>
-          <p:nvPr/>
-        </p:nvPicPr>
-        <p:blipFill>
-          <a:blip r:embed="rId12">
-            <a:extLst>
-              <a:ext uri="{28A0092B-C50C-407E-A947-70E740481C1C}">
-                <a14:useLocalDpi xmlns:a14="http://schemas.microsoft.com/office/drawing/2010/main" val="0"/>
-              </a:ext>
-            </a:extLst>
-          </a:blip>
-          <a:srcRect/>
-          <a:stretch>
-            <a:fillRect/>
-          </a:stretch>
-        </p:blipFill>
-        <p:spPr bwMode="auto">
-          <a:xfrm>
-            <a:off x="7360742" y="2728929"/>
-            <a:ext cx="1219871" cy="1219871"/>
+        </p:nvSpPr>
+        <p:spPr>
+          <a:xfrm>
+            <a:off x="4474256" y="817040"/>
+            <a:ext cx="596638" cy="369332"/>
           </a:xfrm>
           <a:prstGeom prst="rect">
             <a:avLst/>
           </a:prstGeom>
           <a:noFill/>
-          <a:extLst>
-            <a:ext uri="{909E8E84-426E-40DD-AFC4-6F175D3DCCD1}">
-              <a14:hiddenFill xmlns:a14="http://schemas.microsoft.com/office/drawing/2010/main">
-                <a:solidFill>
-                  <a:srgbClr val="FFFFFF"/>
-                </a:solidFill>
-              </a14:hiddenFill>
-            </a:ext>
-          </a:extLst>
-        </p:spPr>
-      </p:pic>
-      <p:pic>
-        <p:nvPicPr>
-          <p:cNvPr id="1046" name="Picture 22">
+        </p:spPr>
+        <p:txBody>
+          <a:bodyPr wrap="none" rtlCol="0">
+            <a:spAutoFit/>
+          </a:bodyPr>
+          <a:lstStyle/>
+          <a:p>
+            <a:r>
+              <a:rPr lang="en-CO" b="1" dirty="0"/>
+              <a:t>PC 3</a:t>
+            </a:r>
+          </a:p>
+        </p:txBody>
+      </p:sp>
+      <p:cxnSp>
+        <p:nvCxnSpPr>
+          <p:cNvPr id="1073" name="Straight Arrow Connector 1072">
             <a:extLst>
               <a:ext uri="{FF2B5EF4-FFF2-40B4-BE49-F238E27FC236}">
-                <a16:creationId xmlns:a16="http://schemas.microsoft.com/office/drawing/2014/main" id="{B819A134-DB7E-BAE2-5AC2-B47FAEC19C13}"/>
-              </a:ext>
-            </a:extLst>
-          </p:cNvPr>
-          <p:cNvPicPr>
-            <a:picLocks noChangeAspect="1" noChangeArrowheads="1"/>
-          </p:cNvPicPr>
-          <p:nvPr/>
-        </p:nvPicPr>
-        <p:blipFill>
-          <a:blip r:embed="rId13">
-            <a:extLst>
-              <a:ext uri="{28A0092B-C50C-407E-A947-70E740481C1C}">
-                <a14:useLocalDpi xmlns:a14="http://schemas.microsoft.com/office/drawing/2010/main" val="0"/>
-              </a:ext>
-            </a:extLst>
-          </a:blip>
-          <a:srcRect/>
-          <a:stretch>
-            <a:fillRect/>
-          </a:stretch>
-        </p:blipFill>
-        <p:spPr bwMode="auto">
-          <a:xfrm>
-            <a:off x="9938663" y="3192915"/>
-            <a:ext cx="912139" cy="912139"/>
-          </a:xfrm>
-          <a:prstGeom prst="rect">
-            <a:avLst/>
-          </a:prstGeom>
-          <a:noFill/>
-          <a:extLst>
-            <a:ext uri="{909E8E84-426E-40DD-AFC4-6F175D3DCCD1}">
-              <a14:hiddenFill xmlns:a14="http://schemas.microsoft.com/office/drawing/2010/main">
-                <a:solidFill>
-                  <a:srgbClr val="FFFFFF"/>
-                </a:solidFill>
-              </a14:hiddenFill>
-            </a:ext>
-          </a:extLst>
-        </p:spPr>
-      </p:pic>
-      <p:cxnSp>
-        <p:nvCxnSpPr>
-          <p:cNvPr id="41" name="Straight Arrow Connector 40">
-            <a:extLst>
-              <a:ext uri="{FF2B5EF4-FFF2-40B4-BE49-F238E27FC236}">
-                <a16:creationId xmlns:a16="http://schemas.microsoft.com/office/drawing/2014/main" id="{974D32E0-7488-3D54-41E6-52AAEA38E836}"/>
+                <a16:creationId xmlns:a16="http://schemas.microsoft.com/office/drawing/2014/main" id="{5AE28A28-6BA2-EDCA-FF57-A8094BF50035}"/>
               </a:ext>
             </a:extLst>
           </p:cNvPr>
           <p:cNvCxnSpPr>
-            <a:endCxn id="11" idx="2"/>
+            <a:cxnSpLocks/>
           </p:cNvCxnSpPr>
           <p:nvPr/>
         </p:nvCxnSpPr>
         <p:spPr>
-          <a:xfrm flipH="1" flipV="1">
-            <a:off x="4832384" y="4818396"/>
-            <a:ext cx="10180" cy="503301"/>
+          <a:xfrm>
+            <a:off x="3704006" y="1785656"/>
+            <a:ext cx="441896" cy="0"/>
           </a:xfrm>
           <a:prstGeom prst="straightConnector1">
             <a:avLst/>
@@ -28110,10 +27943,10 @@
       </p:cxnSp>
       <p:cxnSp>
         <p:nvCxnSpPr>
-          <p:cNvPr id="42" name="Straight Arrow Connector 41">
+          <p:cNvPr id="1075" name="Straight Arrow Connector 1074">
             <a:extLst>
               <a:ext uri="{FF2B5EF4-FFF2-40B4-BE49-F238E27FC236}">
-                <a16:creationId xmlns:a16="http://schemas.microsoft.com/office/drawing/2014/main" id="{3DC56945-C397-7FCD-5BF0-5106FB1EC618}"/>
+                <a16:creationId xmlns:a16="http://schemas.microsoft.com/office/drawing/2014/main" id="{9BCA9E71-D2E0-9E5E-846F-825EDE9C4379}"/>
               </a:ext>
             </a:extLst>
           </p:cNvPr>
@@ -28124,16 +27957,13 @@
         </p:nvCxnSpPr>
         <p:spPr>
           <a:xfrm>
-            <a:off x="4779404" y="2032088"/>
-            <a:ext cx="3403" cy="284563"/>
+            <a:off x="3703803" y="4448943"/>
+            <a:ext cx="442099" cy="0"/>
           </a:xfrm>
           <a:prstGeom prst="straightConnector1">
             <a:avLst/>
           </a:prstGeom>
           <a:ln w="38100">
-            <a:solidFill>
-              <a:schemeClr val="accent1"/>
-            </a:solidFill>
             <a:tailEnd type="triangle"/>
           </a:ln>
         </p:spPr>
@@ -28154,25 +27984,24 @@
       </p:cxnSp>
       <p:cxnSp>
         <p:nvCxnSpPr>
-          <p:cNvPr id="45" name="Elbow Connector 44">
+          <p:cNvPr id="1076" name="Straight Arrow Connector 1075">
             <a:extLst>
               <a:ext uri="{FF2B5EF4-FFF2-40B4-BE49-F238E27FC236}">
-                <a16:creationId xmlns:a16="http://schemas.microsoft.com/office/drawing/2014/main" id="{DBEE6808-0CC5-D9E8-15D5-3AEF69D12771}"/>
+                <a16:creationId xmlns:a16="http://schemas.microsoft.com/office/drawing/2014/main" id="{001F829F-C936-AEFF-9D69-E2300B198717}"/>
               </a:ext>
             </a:extLst>
           </p:cNvPr>
           <p:cNvCxnSpPr>
             <a:cxnSpLocks/>
-            <a:stCxn id="36" idx="3"/>
           </p:cNvCxnSpPr>
           <p:nvPr/>
         </p:nvCxnSpPr>
         <p:spPr>
           <a:xfrm>
-            <a:off x="6305467" y="1083859"/>
-            <a:ext cx="1665210" cy="1918553"/>
-          </a:xfrm>
-          <a:prstGeom prst="bentConnector2">
+            <a:off x="3703802" y="6371759"/>
+            <a:ext cx="420200" cy="1251"/>
+          </a:xfrm>
+          <a:prstGeom prst="straightConnector1">
             <a:avLst/>
           </a:prstGeom>
           <a:ln w="38100">
@@ -28194,28 +28023,110 @@
           </a:fontRef>
         </p:style>
       </p:cxnSp>
+      <p:pic>
+        <p:nvPicPr>
+          <p:cNvPr id="1078" name="Picture 1077">
+            <a:extLst>
+              <a:ext uri="{FF2B5EF4-FFF2-40B4-BE49-F238E27FC236}">
+                <a16:creationId xmlns:a16="http://schemas.microsoft.com/office/drawing/2014/main" id="{B9EF646D-AD03-62F2-12DF-9FC40CAAF9C0}"/>
+              </a:ext>
+            </a:extLst>
+          </p:cNvPr>
+          <p:cNvPicPr>
+            <a:picLocks noChangeAspect="1"/>
+          </p:cNvPicPr>
+          <p:nvPr/>
+        </p:nvPicPr>
+        <p:blipFill>
+          <a:blip r:embed="rId11">
+            <a:clrChange>
+              <a:clrFrom>
+                <a:srgbClr val="FFFFFF"/>
+              </a:clrFrom>
+              <a:clrTo>
+                <a:srgbClr val="FFFFFF">
+                  <a:alpha val="0"/>
+                </a:srgbClr>
+              </a:clrTo>
+            </a:clrChange>
+          </a:blip>
+          <a:stretch>
+            <a:fillRect/>
+          </a:stretch>
+        </p:blipFill>
+        <p:spPr>
+          <a:xfrm>
+            <a:off x="4724338" y="3331030"/>
+            <a:ext cx="831878" cy="657662"/>
+          </a:xfrm>
+          <a:prstGeom prst="rect">
+            <a:avLst/>
+          </a:prstGeom>
+        </p:spPr>
+      </p:pic>
+      <p:sp>
+        <p:nvSpPr>
+          <p:cNvPr id="1079" name="TextBox 1078">
+            <a:extLst>
+              <a:ext uri="{FF2B5EF4-FFF2-40B4-BE49-F238E27FC236}">
+                <a16:creationId xmlns:a16="http://schemas.microsoft.com/office/drawing/2014/main" id="{6968F40B-ECA4-53C2-DEC9-C4EEC05EA3CA}"/>
+              </a:ext>
+            </a:extLst>
+          </p:cNvPr>
+          <p:cNvSpPr txBox="1"/>
+          <p:nvPr/>
+        </p:nvSpPr>
+        <p:spPr>
+          <a:xfrm>
+            <a:off x="4124002" y="3998744"/>
+            <a:ext cx="2211183" cy="523220"/>
+          </a:xfrm>
+          <a:prstGeom prst="rect">
+            <a:avLst/>
+          </a:prstGeom>
+          <a:noFill/>
+        </p:spPr>
+        <p:txBody>
+          <a:bodyPr wrap="none" rtlCol="0">
+            <a:spAutoFit/>
+          </a:bodyPr>
+          <a:lstStyle/>
+          <a:p>
+            <a:pPr algn="ctr"/>
+            <a:r>
+              <a:rPr lang="en-CO" sz="1400" dirty="0"/>
+              <a:t>IBM Cloud Internet Services</a:t>
+            </a:r>
+          </a:p>
+          <a:p>
+            <a:pPr algn="ctr"/>
+            <a:r>
+              <a:rPr lang="en-CO" sz="1400" dirty="0"/>
+              <a:t>(DNS, WAF, DDoS)</a:t>
+            </a:r>
+          </a:p>
+        </p:txBody>
+      </p:sp>
       <p:cxnSp>
         <p:nvCxnSpPr>
-          <p:cNvPr id="46" name="Elbow Connector 45">
+          <p:cNvPr id="1080" name="Straight Arrow Connector 1079">
             <a:extLst>
               <a:ext uri="{FF2B5EF4-FFF2-40B4-BE49-F238E27FC236}">
-                <a16:creationId xmlns:a16="http://schemas.microsoft.com/office/drawing/2014/main" id="{3684E040-F3C9-6C45-659C-E0E361BFAF0D}"/>
+                <a16:creationId xmlns:a16="http://schemas.microsoft.com/office/drawing/2014/main" id="{FB87C1E8-B230-63A2-7ED6-D2267A31AB5C}"/>
               </a:ext>
             </a:extLst>
           </p:cNvPr>
           <p:cNvCxnSpPr>
             <a:cxnSpLocks/>
-            <a:stCxn id="37" idx="3"/>
-            <a:endCxn id="1044" idx="2"/>
           </p:cNvCxnSpPr>
           <p:nvPr/>
         </p:nvCxnSpPr>
         <p:spPr>
-          <a:xfrm flipV="1">
-            <a:off x="6303842" y="3948800"/>
-            <a:ext cx="1666836" cy="2078175"/>
-          </a:xfrm>
-          <a:prstGeom prst="bentConnector2">
+          <a:xfrm>
+            <a:off x="5713865" y="1001706"/>
+            <a:ext cx="0" cy="388366"/>
+          </a:xfrm>
+          <a:prstGeom prst="straightConnector1">
             <a:avLst/>
           </a:prstGeom>
           <a:ln w="38100">
@@ -28237,12 +28148,100 @@
           </a:fontRef>
         </p:style>
       </p:cxnSp>
+      <p:sp>
+        <p:nvSpPr>
+          <p:cNvPr id="1085" name="TextBox 1084">
+            <a:extLst>
+              <a:ext uri="{FF2B5EF4-FFF2-40B4-BE49-F238E27FC236}">
+                <a16:creationId xmlns:a16="http://schemas.microsoft.com/office/drawing/2014/main" id="{A58ED0D2-ABA8-7CEA-D53F-0CE49841E992}"/>
+              </a:ext>
+            </a:extLst>
+          </p:cNvPr>
+          <p:cNvSpPr txBox="1"/>
+          <p:nvPr/>
+        </p:nvSpPr>
+        <p:spPr>
+          <a:xfrm>
+            <a:off x="5038393" y="639134"/>
+            <a:ext cx="1508042" cy="369332"/>
+          </a:xfrm>
+          <a:prstGeom prst="rect">
+            <a:avLst/>
+          </a:prstGeom>
+          <a:noFill/>
+        </p:spPr>
+        <p:txBody>
+          <a:bodyPr wrap="none" rtlCol="0">
+            <a:spAutoFit/>
+          </a:bodyPr>
+          <a:lstStyle/>
+          <a:p>
+            <a:r>
+              <a:rPr lang="en-CO" dirty="0"/>
+              <a:t>Ethernet/WiFi</a:t>
+            </a:r>
+          </a:p>
+        </p:txBody>
+      </p:sp>
+      <p:sp>
+        <p:nvSpPr>
+          <p:cNvPr id="1098" name="Rounded Rectangle 1097">
+            <a:extLst>
+              <a:ext uri="{FF2B5EF4-FFF2-40B4-BE49-F238E27FC236}">
+                <a16:creationId xmlns:a16="http://schemas.microsoft.com/office/drawing/2014/main" id="{D2BB65F1-5715-8F27-B5D4-F39F658E0C1B}"/>
+              </a:ext>
+            </a:extLst>
+          </p:cNvPr>
+          <p:cNvSpPr/>
+          <p:nvPr/>
+        </p:nvSpPr>
+        <p:spPr>
+          <a:xfrm>
+            <a:off x="7598616" y="639133"/>
+            <a:ext cx="4006473" cy="5106599"/>
+          </a:xfrm>
+          <a:prstGeom prst="roundRect">
+            <a:avLst>
+              <a:gd name="adj" fmla="val 3286"/>
+            </a:avLst>
+          </a:prstGeom>
+          <a:solidFill>
+            <a:srgbClr val="DEEBF7">
+              <a:alpha val="81876"/>
+            </a:srgbClr>
+          </a:solidFill>
+        </p:spPr>
+        <p:style>
+          <a:lnRef idx="2">
+            <a:schemeClr val="accent1">
+              <a:shade val="50000"/>
+            </a:schemeClr>
+          </a:lnRef>
+          <a:fillRef idx="1">
+            <a:schemeClr val="accent1"/>
+          </a:fillRef>
+          <a:effectRef idx="0">
+            <a:schemeClr val="accent1"/>
+          </a:effectRef>
+          <a:fontRef idx="minor">
+            <a:schemeClr val="lt1"/>
+          </a:fontRef>
+        </p:style>
+        <p:txBody>
+          <a:bodyPr rtlCol="0" anchor="ctr"/>
+          <a:lstStyle/>
+          <a:p>
+            <a:pPr algn="ctr"/>
+            <a:endParaRPr lang="en-CO"/>
+          </a:p>
+        </p:txBody>
+      </p:sp>
       <p:cxnSp>
         <p:nvCxnSpPr>
-          <p:cNvPr id="52" name="Straight Arrow Connector 51">
+          <p:cNvPr id="58" name="Straight Arrow Connector 57">
             <a:extLst>
               <a:ext uri="{FF2B5EF4-FFF2-40B4-BE49-F238E27FC236}">
-                <a16:creationId xmlns:a16="http://schemas.microsoft.com/office/drawing/2014/main" id="{254C0C53-8DD1-8D66-E34A-231C0BFCCB0F}"/>
+                <a16:creationId xmlns:a16="http://schemas.microsoft.com/office/drawing/2014/main" id="{4EBB5D45-3E12-85CC-6362-4A0C327D1129}"/>
               </a:ext>
             </a:extLst>
           </p:cNvPr>
@@ -28253,8 +28252,8 @@
         </p:nvCxnSpPr>
         <p:spPr>
           <a:xfrm>
-            <a:off x="6408558" y="3517484"/>
-            <a:ext cx="952184" cy="1"/>
+            <a:off x="5686244" y="3765747"/>
+            <a:ext cx="1617993" cy="0"/>
           </a:xfrm>
           <a:prstGeom prst="straightConnector1">
             <a:avLst/>
@@ -28278,570 +28277,587 @@
           </a:fontRef>
         </p:style>
       </p:cxnSp>
-      <p:cxnSp>
-        <p:nvCxnSpPr>
-          <p:cNvPr id="56" name="Straight Arrow Connector 55">
+      <p:sp>
+        <p:nvSpPr>
+          <p:cNvPr id="1094" name="TextBox 1093">
             <a:extLst>
               <a:ext uri="{FF2B5EF4-FFF2-40B4-BE49-F238E27FC236}">
-                <a16:creationId xmlns:a16="http://schemas.microsoft.com/office/drawing/2014/main" id="{E0FB65C8-E8FE-CF12-8A2C-E2CB773CBA35}"/>
+                <a16:creationId xmlns:a16="http://schemas.microsoft.com/office/drawing/2014/main" id="{414E7C3E-4305-102F-DFDD-7FF2EA18CC0A}"/>
               </a:ext>
             </a:extLst>
           </p:cNvPr>
-          <p:cNvCxnSpPr/>
+          <p:cNvSpPr txBox="1"/>
           <p:nvPr/>
-        </p:nvCxnSpPr>
-        <p:spPr>
-          <a:xfrm flipV="1">
-            <a:off x="8380428" y="3948402"/>
-            <a:ext cx="0" cy="1291749"/>
-          </a:xfrm>
-          <a:prstGeom prst="straightConnector1">
+        </p:nvSpPr>
+        <p:spPr>
+          <a:xfrm>
+            <a:off x="6475437" y="3419594"/>
+            <a:ext cx="780919" cy="369332"/>
+          </a:xfrm>
+          <a:prstGeom prst="rect">
             <a:avLst/>
           </a:prstGeom>
-          <a:ln w="38100">
-            <a:tailEnd type="triangle"/>
+          <a:noFill/>
+        </p:spPr>
+        <p:txBody>
+          <a:bodyPr wrap="none" rtlCol="0">
+            <a:spAutoFit/>
+          </a:bodyPr>
+          <a:lstStyle/>
+          <a:p>
+            <a:r>
+              <a:rPr lang="en-CO" dirty="0"/>
+              <a:t>HTTPS</a:t>
+            </a:r>
+          </a:p>
+        </p:txBody>
+      </p:sp>
+      <p:pic>
+        <p:nvPicPr>
+          <p:cNvPr id="1097" name="Graphic 1096">
+            <a:extLst>
+              <a:ext uri="{FF2B5EF4-FFF2-40B4-BE49-F238E27FC236}">
+                <a16:creationId xmlns:a16="http://schemas.microsoft.com/office/drawing/2014/main" id="{FE35B880-F724-7751-B0C1-560B2BBC29E7}"/>
+              </a:ext>
+            </a:extLst>
+          </p:cNvPr>
+          <p:cNvPicPr>
+            <a:picLocks noChangeAspect="1"/>
+          </p:cNvPicPr>
+          <p:nvPr/>
+        </p:nvPicPr>
+        <p:blipFill>
+          <a:blip r:embed="rId12">
+            <a:extLst>
+              <a:ext uri="{28A0092B-C50C-407E-A947-70E740481C1C}">
+                <a14:useLocalDpi xmlns:a14="http://schemas.microsoft.com/office/drawing/2010/main" val="0"/>
+              </a:ext>
+              <a:ext uri="{96DAC541-7B7A-43D3-8B79-37D633B846F1}">
+                <asvg:svgBlip xmlns:asvg="http://schemas.microsoft.com/office/drawing/2016/SVG/main" r:embed="rId13"/>
+              </a:ext>
+            </a:extLst>
+          </a:blip>
+          <a:stretch>
+            <a:fillRect/>
+          </a:stretch>
+        </p:blipFill>
+        <p:spPr>
+          <a:xfrm>
+            <a:off x="8260876" y="747029"/>
+            <a:ext cx="526895" cy="526895"/>
+          </a:xfrm>
+          <a:prstGeom prst="rect">
+            <a:avLst/>
+          </a:prstGeom>
+        </p:spPr>
+      </p:pic>
+      <p:sp>
+        <p:nvSpPr>
+          <p:cNvPr id="1096" name="Rectangle 1095">
+            <a:extLst>
+              <a:ext uri="{FF2B5EF4-FFF2-40B4-BE49-F238E27FC236}">
+                <a16:creationId xmlns:a16="http://schemas.microsoft.com/office/drawing/2014/main" id="{1F31C57B-38F0-13FB-1864-ABCCFEF73655}"/>
+              </a:ext>
+            </a:extLst>
+          </p:cNvPr>
+          <p:cNvSpPr/>
+          <p:nvPr/>
+        </p:nvSpPr>
+        <p:spPr>
+          <a:xfrm>
+            <a:off x="8770942" y="858867"/>
+            <a:ext cx="2201244" cy="261610"/>
+          </a:xfrm>
+          <a:prstGeom prst="rect">
+            <a:avLst/>
+          </a:prstGeom>
+        </p:spPr>
+        <p:txBody>
+          <a:bodyPr wrap="none">
+            <a:spAutoFit/>
+          </a:bodyPr>
+          <a:lstStyle/>
+          <a:p>
+            <a:r>
+              <a:rPr lang="en-US" sz="1100" b="1" dirty="0">
+                <a:latin typeface="IBM Plex Sans" panose="020B0503050000000000" pitchFamily="34" charset="0"/>
+              </a:rPr>
+              <a:t>IBM Cloud Kubernetes Service</a:t>
+            </a:r>
+            <a:endParaRPr lang="es-CO" sz="1100" b="1" dirty="0">
+              <a:latin typeface="IBM Plex Sans" panose="020B0503050000000000" pitchFamily="34" charset="0"/>
+            </a:endParaRPr>
+          </a:p>
+        </p:txBody>
+      </p:sp>
+      <p:pic>
+        <p:nvPicPr>
+          <p:cNvPr id="2" name="Picture 2" descr="Ibm, cloud, logo Icon in Vector Logo">
+            <a:extLst>
+              <a:ext uri="{FF2B5EF4-FFF2-40B4-BE49-F238E27FC236}">
+                <a16:creationId xmlns:a16="http://schemas.microsoft.com/office/drawing/2014/main" id="{8906C5B7-2DAA-2CF3-7556-C1BE8B8D22E1}"/>
+              </a:ext>
+            </a:extLst>
+          </p:cNvPr>
+          <p:cNvPicPr>
+            <a:picLocks noChangeAspect="1" noChangeArrowheads="1"/>
+          </p:cNvPicPr>
+          <p:nvPr/>
+        </p:nvPicPr>
+        <p:blipFill>
+          <a:blip r:embed="rId14">
+            <a:extLst>
+              <a:ext uri="{28A0092B-C50C-407E-A947-70E740481C1C}">
+                <a14:useLocalDpi xmlns:a14="http://schemas.microsoft.com/office/drawing/2010/main" val="0"/>
+              </a:ext>
+            </a:extLst>
+          </a:blip>
+          <a:srcRect/>
+          <a:stretch>
+            <a:fillRect/>
+          </a:stretch>
+        </p:blipFill>
+        <p:spPr bwMode="auto">
+          <a:xfrm>
+            <a:off x="9304119" y="5582613"/>
+            <a:ext cx="2494444" cy="1247222"/>
+          </a:xfrm>
+          <a:prstGeom prst="rect">
+            <a:avLst/>
+          </a:prstGeom>
+          <a:noFill/>
+          <a:extLst>
+            <a:ext uri="{909E8E84-426E-40DD-AFC4-6F175D3DCCD1}">
+              <a14:hiddenFill xmlns:a14="http://schemas.microsoft.com/office/drawing/2010/main">
+                <a:solidFill>
+                  <a:srgbClr val="FFFFFF"/>
+                </a:solidFill>
+              </a14:hiddenFill>
+            </a:ext>
+          </a:extLst>
+        </p:spPr>
+      </p:pic>
+      <p:sp>
+        <p:nvSpPr>
+          <p:cNvPr id="1099" name="Rounded Rectangle 1098">
+            <a:extLst>
+              <a:ext uri="{FF2B5EF4-FFF2-40B4-BE49-F238E27FC236}">
+                <a16:creationId xmlns:a16="http://schemas.microsoft.com/office/drawing/2014/main" id="{A1B16763-6DC3-D5BA-7F1F-1982A3768945}"/>
+              </a:ext>
+            </a:extLst>
+          </p:cNvPr>
+          <p:cNvSpPr/>
+          <p:nvPr/>
+        </p:nvSpPr>
+        <p:spPr>
+          <a:xfrm>
+            <a:off x="7822786" y="1343919"/>
+            <a:ext cx="3485996" cy="3727947"/>
+          </a:xfrm>
+          <a:prstGeom prst="roundRect">
+            <a:avLst>
+              <a:gd name="adj" fmla="val 0"/>
+            </a:avLst>
+          </a:prstGeom>
+          <a:solidFill>
+            <a:srgbClr val="DEEBF7">
+              <a:alpha val="81876"/>
+            </a:srgbClr>
+          </a:solidFill>
+          <a:ln>
+            <a:prstDash val="dash"/>
           </a:ln>
         </p:spPr>
         <p:style>
-          <a:lnRef idx="1">
-            <a:schemeClr val="accent1"/>
+          <a:lnRef idx="2">
+            <a:schemeClr val="accent1">
+              <a:shade val="50000"/>
+            </a:schemeClr>
           </a:lnRef>
-          <a:fillRef idx="0">
+          <a:fillRef idx="1">
             <a:schemeClr val="accent1"/>
           </a:fillRef>
           <a:effectRef idx="0">
             <a:schemeClr val="accent1"/>
           </a:effectRef>
           <a:fontRef idx="minor">
-            <a:schemeClr val="tx1"/>
+            <a:schemeClr val="lt1"/>
           </a:fontRef>
         </p:style>
-      </p:cxnSp>
-      <p:cxnSp>
-        <p:nvCxnSpPr>
-          <p:cNvPr id="58" name="Straight Arrow Connector 57">
+        <p:txBody>
+          <a:bodyPr rtlCol="0" anchor="t"/>
+          <a:lstStyle/>
+          <a:p>
+            <a:pPr algn="ctr"/>
+            <a:r>
+              <a:rPr lang="en-CO" dirty="0">
+                <a:solidFill>
+                  <a:schemeClr val="tx1"/>
+                </a:solidFill>
+              </a:rPr>
+              <a:t>Worker Node</a:t>
+            </a:r>
+          </a:p>
+        </p:txBody>
+      </p:sp>
+      <p:sp>
+        <p:nvSpPr>
+          <p:cNvPr id="1100" name="Rounded Rectangle 1099">
             <a:extLst>
               <a:ext uri="{FF2B5EF4-FFF2-40B4-BE49-F238E27FC236}">
-                <a16:creationId xmlns:a16="http://schemas.microsoft.com/office/drawing/2014/main" id="{4EBB5D45-3E12-85CC-6362-4A0C327D1129}"/>
+                <a16:creationId xmlns:a16="http://schemas.microsoft.com/office/drawing/2014/main" id="{710155DD-4212-AEDE-74DB-EC73B1ED71C8}"/>
               </a:ext>
             </a:extLst>
           </p:cNvPr>
-          <p:cNvCxnSpPr/>
+          <p:cNvSpPr/>
           <p:nvPr/>
-        </p:nvCxnSpPr>
-        <p:spPr>
-          <a:xfrm>
-            <a:off x="8719794" y="3429000"/>
-            <a:ext cx="580417" cy="0"/>
-          </a:xfrm>
-          <a:prstGeom prst="straightConnector1">
-            <a:avLst/>
+        </p:nvSpPr>
+        <p:spPr>
+          <a:xfrm>
+            <a:off x="7821644" y="5179168"/>
+            <a:ext cx="3485996" cy="296144"/>
+          </a:xfrm>
+          <a:prstGeom prst="roundRect">
+            <a:avLst>
+              <a:gd name="adj" fmla="val 0"/>
+            </a:avLst>
           </a:prstGeom>
-          <a:ln w="38100">
-            <a:tailEnd type="triangle"/>
-          </a:ln>
+          <a:solidFill>
+            <a:schemeClr val="accent5">
+              <a:lumMod val="60000"/>
+              <a:lumOff val="40000"/>
+              <a:alpha val="81876"/>
+            </a:schemeClr>
+          </a:solidFill>
         </p:spPr>
         <p:style>
-          <a:lnRef idx="1">
-            <a:schemeClr val="accent1"/>
+          <a:lnRef idx="2">
+            <a:schemeClr val="accent1">
+              <a:shade val="50000"/>
+            </a:schemeClr>
           </a:lnRef>
-          <a:fillRef idx="0">
+          <a:fillRef idx="1">
             <a:schemeClr val="accent1"/>
           </a:fillRef>
           <a:effectRef idx="0">
             <a:schemeClr val="accent1"/>
           </a:effectRef>
           <a:fontRef idx="minor">
-            <a:schemeClr val="tx1"/>
+            <a:schemeClr val="lt1"/>
           </a:fontRef>
         </p:style>
-      </p:cxnSp>
-      <p:cxnSp>
-        <p:nvCxnSpPr>
-          <p:cNvPr id="60" name="Straight Connector 59">
+        <p:txBody>
+          <a:bodyPr rtlCol="0" anchor="ctr"/>
+          <a:lstStyle/>
+          <a:p>
+            <a:pPr algn="ctr"/>
+            <a:r>
+              <a:rPr lang="en-CO" dirty="0">
+                <a:solidFill>
+                  <a:schemeClr val="tx1"/>
+                </a:solidFill>
+              </a:rPr>
+              <a:t>2x4</a:t>
+            </a:r>
+          </a:p>
+        </p:txBody>
+      </p:sp>
+      <p:sp>
+        <p:nvSpPr>
+          <p:cNvPr id="1104" name="Rounded Rectangle 1103">
             <a:extLst>
               <a:ext uri="{FF2B5EF4-FFF2-40B4-BE49-F238E27FC236}">
-                <a16:creationId xmlns:a16="http://schemas.microsoft.com/office/drawing/2014/main" id="{B945430E-7DB6-D679-1DAF-738805FBF70A}"/>
+                <a16:creationId xmlns:a16="http://schemas.microsoft.com/office/drawing/2014/main" id="{B3F556AA-8055-04CC-E52E-2A7AF057D226}"/>
               </a:ext>
             </a:extLst>
           </p:cNvPr>
-          <p:cNvCxnSpPr>
-            <a:cxnSpLocks/>
-            <a:stCxn id="30" idx="3"/>
-            <a:endCxn id="27" idx="1"/>
-          </p:cNvCxnSpPr>
+          <p:cNvSpPr/>
           <p:nvPr/>
-        </p:nvCxnSpPr>
-        <p:spPr>
-          <a:xfrm>
-            <a:off x="2337408" y="3022195"/>
-            <a:ext cx="590551" cy="0"/>
-          </a:xfrm>
-          <a:prstGeom prst="line">
-            <a:avLst/>
+        </p:nvSpPr>
+        <p:spPr>
+          <a:xfrm>
+            <a:off x="7910444" y="1774594"/>
+            <a:ext cx="3279435" cy="1536329"/>
+          </a:xfrm>
+          <a:prstGeom prst="roundRect">
+            <a:avLst>
+              <a:gd name="adj" fmla="val 0"/>
+            </a:avLst>
           </a:prstGeom>
-          <a:ln w="12700"/>
+          <a:solidFill>
+            <a:srgbClr val="DEEBF7">
+              <a:alpha val="81876"/>
+            </a:srgbClr>
+          </a:solidFill>
+          <a:ln>
+            <a:prstDash val="solid"/>
+          </a:ln>
         </p:spPr>
         <p:style>
-          <a:lnRef idx="1">
-            <a:schemeClr val="accent1"/>
+          <a:lnRef idx="2">
+            <a:schemeClr val="accent1">
+              <a:shade val="50000"/>
+            </a:schemeClr>
           </a:lnRef>
-          <a:fillRef idx="0">
+          <a:fillRef idx="1">
             <a:schemeClr val="accent1"/>
           </a:fillRef>
           <a:effectRef idx="0">
             <a:schemeClr val="accent1"/>
           </a:effectRef>
           <a:fontRef idx="minor">
-            <a:schemeClr val="tx1"/>
+            <a:schemeClr val="lt1"/>
           </a:fontRef>
         </p:style>
-      </p:cxnSp>
-      <p:cxnSp>
-        <p:nvCxnSpPr>
-          <p:cNvPr id="63" name="Straight Connector 62">
+        <p:txBody>
+          <a:bodyPr rtlCol="0" anchor="t"/>
+          <a:lstStyle/>
+          <a:p>
+            <a:pPr algn="ctr"/>
+            <a:r>
+              <a:rPr lang="en-US" dirty="0">
+                <a:solidFill>
+                  <a:schemeClr val="tx1"/>
+                </a:solidFill>
+              </a:rPr>
+              <a:t>i</a:t>
+            </a:r>
+            <a:r>
+              <a:rPr lang="en-CO" dirty="0">
+                <a:solidFill>
+                  <a:schemeClr val="tx1"/>
+                </a:solidFill>
+              </a:rPr>
+              <a:t>gnition.purplewood.solutions</a:t>
+            </a:r>
+          </a:p>
+        </p:txBody>
+      </p:sp>
+      <p:pic>
+        <p:nvPicPr>
+          <p:cNvPr id="13" name="Picture 10" descr="Standard Architecture - Ignition User Manual 8.1 - Ignition Documentation">
             <a:extLst>
               <a:ext uri="{FF2B5EF4-FFF2-40B4-BE49-F238E27FC236}">
-                <a16:creationId xmlns:a16="http://schemas.microsoft.com/office/drawing/2014/main" id="{0E00D6C7-C4FD-180F-4A36-9882D023864B}"/>
+                <a16:creationId xmlns:a16="http://schemas.microsoft.com/office/drawing/2014/main" id="{7804B373-269E-0098-63BA-093A49F8A8B5}"/>
               </a:ext>
             </a:extLst>
           </p:cNvPr>
-          <p:cNvCxnSpPr>
-            <a:cxnSpLocks/>
-            <a:endCxn id="24" idx="1"/>
-          </p:cNvCxnSpPr>
+          <p:cNvPicPr>
+            <a:picLocks noChangeAspect="1" noChangeArrowheads="1"/>
+          </p:cNvPicPr>
           <p:nvPr/>
-        </p:nvCxnSpPr>
-        <p:spPr>
-          <a:xfrm>
-            <a:off x="3409114" y="3022195"/>
-            <a:ext cx="581163" cy="0"/>
-          </a:xfrm>
-          <a:prstGeom prst="line">
+        </p:nvPicPr>
+        <p:blipFill rotWithShape="1">
+          <a:blip r:embed="rId5">
+            <a:extLst>
+              <a:ext uri="{BEBA8EAE-BF5A-486C-A8C5-ECC9F3942E4B}">
+                <a14:imgProps xmlns:a14="http://schemas.microsoft.com/office/drawing/2010/main">
+                  <a14:imgLayer r:embed="rId6">
+                    <a14:imgEffect>
+                      <a14:backgroundRemoval t="10247" b="42874" l="44459" r="56561">
+                        <a14:foregroundMark x1="46115" y1="19435" x2="45478" y2="34393"/>
+                        <a14:foregroundMark x1="47070" y1="21790" x2="47070" y2="30860"/>
+                        <a14:foregroundMark x1="45478" y1="20966" x2="45541" y2="28504"/>
+                        <a14:foregroundMark x1="45541" y1="28504" x2="45987" y2="31331"/>
+                        <a14:foregroundMark x1="53439" y1="16961" x2="53248" y2="29564"/>
+                        <a14:foregroundMark x1="48025" y1="41578" x2="48025" y2="41578"/>
+                        <a14:foregroundMark x1="52611" y1="10365" x2="52611" y2="10365"/>
+                        <a14:foregroundMark x1="56433" y1="15665" x2="56433" y2="15665"/>
+                        <a14:foregroundMark x1="56433" y1="15665" x2="56433" y2="15665"/>
+                        <a14:foregroundMark x1="55924" y1="15548" x2="56497" y2="15665"/>
+                        <a14:foregroundMark x1="48153" y1="42285" x2="48217" y2="42874"/>
+                        <a14:backgroundMark x1="44713" y1="40989" x2="45924" y2="41696"/>
+                        <a14:backgroundMark x1="45478" y1="40989" x2="45987" y2="41578"/>
+                        <a14:backgroundMark x1="45669" y1="40989" x2="46051" y2="41343"/>
+                      </a14:backgroundRemoval>
+                    </a14:imgEffect>
+                  </a14:imgLayer>
+                </a14:imgProps>
+              </a:ext>
+              <a:ext uri="{28A0092B-C50C-407E-A947-70E740481C1C}">
+                <a14:useLocalDpi xmlns:a14="http://schemas.microsoft.com/office/drawing/2010/main" val="0"/>
+              </a:ext>
+            </a:extLst>
+          </a:blip>
+          <a:srcRect l="43083" t="6785" r="41917" b="55459"/>
+          <a:stretch/>
+        </p:blipFill>
+        <p:spPr bwMode="auto">
+          <a:xfrm>
+            <a:off x="8400837" y="2069204"/>
+            <a:ext cx="851418" cy="1158874"/>
+          </a:xfrm>
+          <a:prstGeom prst="rect">
             <a:avLst/>
           </a:prstGeom>
-          <a:ln w="12700"/>
+          <a:noFill/>
+          <a:extLst>
+            <a:ext uri="{909E8E84-426E-40DD-AFC4-6F175D3DCCD1}">
+              <a14:hiddenFill xmlns:a14="http://schemas.microsoft.com/office/drawing/2010/main">
+                <a:solidFill>
+                  <a:srgbClr val="FFFFFF"/>
+                </a:solidFill>
+              </a14:hiddenFill>
+            </a:ext>
+          </a:extLst>
+        </p:spPr>
+      </p:pic>
+      <p:pic>
+        <p:nvPicPr>
+          <p:cNvPr id="1103" name="Picture 4" descr="Ignition Perspective - Apps on Google Play">
+            <a:extLst>
+              <a:ext uri="{FF2B5EF4-FFF2-40B4-BE49-F238E27FC236}">
+                <a16:creationId xmlns:a16="http://schemas.microsoft.com/office/drawing/2014/main" id="{81B6E703-687C-1638-D610-156BD7E9CD5E}"/>
+              </a:ext>
+            </a:extLst>
+          </p:cNvPr>
+          <p:cNvPicPr>
+            <a:picLocks noChangeAspect="1" noChangeArrowheads="1"/>
+          </p:cNvPicPr>
+          <p:nvPr/>
+        </p:nvPicPr>
+        <p:blipFill>
+          <a:blip r:embed="rId15">
+            <a:extLst>
+              <a:ext uri="{28A0092B-C50C-407E-A947-70E740481C1C}">
+                <a14:useLocalDpi xmlns:a14="http://schemas.microsoft.com/office/drawing/2010/main" val="0"/>
+              </a:ext>
+            </a:extLst>
+          </a:blip>
+          <a:srcRect/>
+          <a:stretch>
+            <a:fillRect/>
+          </a:stretch>
+        </p:blipFill>
+        <p:spPr bwMode="auto">
+          <a:xfrm>
+            <a:off x="9667314" y="2308948"/>
+            <a:ext cx="678562" cy="678562"/>
+          </a:xfrm>
+          <a:prstGeom prst="rect">
+            <a:avLst/>
+          </a:prstGeom>
+          <a:noFill/>
+          <a:extLst>
+            <a:ext uri="{909E8E84-426E-40DD-AFC4-6F175D3DCCD1}">
+              <a14:hiddenFill xmlns:a14="http://schemas.microsoft.com/office/drawing/2010/main">
+                <a:solidFill>
+                  <a:srgbClr val="FFFFFF"/>
+                </a:solidFill>
+              </a14:hiddenFill>
+            </a:ext>
+          </a:extLst>
+        </p:spPr>
+      </p:pic>
+      <p:sp>
+        <p:nvSpPr>
+          <p:cNvPr id="1105" name="Rounded Rectangle 1104">
+            <a:extLst>
+              <a:ext uri="{FF2B5EF4-FFF2-40B4-BE49-F238E27FC236}">
+                <a16:creationId xmlns:a16="http://schemas.microsoft.com/office/drawing/2014/main" id="{3FE46E8D-5ED6-C7E1-47BB-D24C7DFD2A85}"/>
+              </a:ext>
+            </a:extLst>
+          </p:cNvPr>
+          <p:cNvSpPr/>
+          <p:nvPr/>
+        </p:nvSpPr>
+        <p:spPr>
+          <a:xfrm>
+            <a:off x="7913852" y="3449220"/>
+            <a:ext cx="3279434" cy="1438716"/>
+          </a:xfrm>
+          <a:prstGeom prst="roundRect">
+            <a:avLst>
+              <a:gd name="adj" fmla="val 0"/>
+            </a:avLst>
+          </a:prstGeom>
+          <a:solidFill>
+            <a:srgbClr val="DEEBF7">
+              <a:alpha val="81876"/>
+            </a:srgbClr>
+          </a:solidFill>
+          <a:ln>
+            <a:prstDash val="solid"/>
+          </a:ln>
         </p:spPr>
         <p:style>
-          <a:lnRef idx="1">
-            <a:schemeClr val="accent1"/>
+          <a:lnRef idx="2">
+            <a:schemeClr val="accent1">
+              <a:shade val="50000"/>
+            </a:schemeClr>
           </a:lnRef>
-          <a:fillRef idx="0">
+          <a:fillRef idx="1">
             <a:schemeClr val="accent1"/>
           </a:fillRef>
           <a:effectRef idx="0">
             <a:schemeClr val="accent1"/>
           </a:effectRef>
           <a:fontRef idx="minor">
-            <a:schemeClr val="tx1"/>
+            <a:schemeClr val="lt1"/>
           </a:fontRef>
         </p:style>
-      </p:cxnSp>
-      <p:cxnSp>
-        <p:nvCxnSpPr>
-          <p:cNvPr id="1027" name="Straight Connector 1026">
+        <p:txBody>
+          <a:bodyPr rtlCol="0" anchor="t"/>
+          <a:lstStyle/>
+          <a:p>
+            <a:pPr algn="ctr"/>
+            <a:r>
+              <a:rPr lang="en-CO" dirty="0">
+                <a:solidFill>
+                  <a:schemeClr val="tx1"/>
+                </a:solidFill>
+              </a:rPr>
+              <a:t>purplewood.solutions</a:t>
+            </a:r>
+          </a:p>
+        </p:txBody>
+      </p:sp>
+      <p:pic>
+        <p:nvPicPr>
+          <p:cNvPr id="1102" name="Picture 1101" descr="A picture containing symbol, graphics, font, logo&#10;&#10;Description automatically generated">
             <a:extLst>
               <a:ext uri="{FF2B5EF4-FFF2-40B4-BE49-F238E27FC236}">
-                <a16:creationId xmlns:a16="http://schemas.microsoft.com/office/drawing/2014/main" id="{90DF1DED-23FF-C027-FE1D-609F0785698B}"/>
+                <a16:creationId xmlns:a16="http://schemas.microsoft.com/office/drawing/2014/main" id="{F01FBD59-E6DF-7FA9-3F2F-739DDFD9BCE6}"/>
               </a:ext>
             </a:extLst>
           </p:cNvPr>
-          <p:cNvCxnSpPr>
-            <a:stCxn id="24" idx="3"/>
-            <a:endCxn id="21" idx="1"/>
-          </p:cNvCxnSpPr>
+          <p:cNvPicPr>
+            <a:picLocks noChangeAspect="1"/>
+          </p:cNvPicPr>
           <p:nvPr/>
-        </p:nvCxnSpPr>
-        <p:spPr>
-          <a:xfrm>
-            <a:off x="4473345" y="3022195"/>
-            <a:ext cx="608840" cy="5798"/>
-          </a:xfrm>
-          <a:prstGeom prst="line">
-            <a:avLst/>
-          </a:prstGeom>
-          <a:ln w="12700"/>
-        </p:spPr>
-        <p:style>
-          <a:lnRef idx="1">
-            <a:schemeClr val="accent1"/>
-          </a:lnRef>
-          <a:fillRef idx="0">
-            <a:schemeClr val="accent1"/>
-          </a:fillRef>
-          <a:effectRef idx="0">
-            <a:schemeClr val="accent1"/>
-          </a:effectRef>
-          <a:fontRef idx="minor">
-            <a:schemeClr val="tx1"/>
-          </a:fontRef>
-        </p:style>
-      </p:cxnSp>
-      <p:cxnSp>
-        <p:nvCxnSpPr>
-          <p:cNvPr id="1031" name="Elbow Connector 1030">
+        </p:nvPicPr>
+        <p:blipFill>
+          <a:blip r:embed="rId16">
+            <a:clrChange>
+              <a:clrFrom>
+                <a:srgbClr val="FFFFFF"/>
+              </a:clrFrom>
+              <a:clrTo>
+                <a:srgbClr val="FFFFFF">
+                  <a:alpha val="0"/>
+                </a:srgbClr>
+              </a:clrTo>
+            </a:clrChange>
             <a:extLst>
-              <a:ext uri="{FF2B5EF4-FFF2-40B4-BE49-F238E27FC236}">
-                <a16:creationId xmlns:a16="http://schemas.microsoft.com/office/drawing/2014/main" id="{F5123488-9CD2-04FC-5006-9940CBAA6FB4}"/>
+              <a:ext uri="{28A0092B-C50C-407E-A947-70E740481C1C}">
+                <a14:useLocalDpi xmlns:a14="http://schemas.microsoft.com/office/drawing/2010/main" val="0"/>
               </a:ext>
             </a:extLst>
-          </p:cNvPr>
-          <p:cNvCxnSpPr>
-            <a:stCxn id="22" idx="2"/>
-            <a:endCxn id="18" idx="3"/>
-          </p:cNvCxnSpPr>
-          <p:nvPr/>
-        </p:nvCxnSpPr>
-        <p:spPr>
-          <a:xfrm rot="5400000">
-            <a:off x="4985494" y="3533153"/>
-            <a:ext cx="345545" cy="308279"/>
-          </a:xfrm>
-          <a:prstGeom prst="bentConnector2">
-            <a:avLst/>
-          </a:prstGeom>
-          <a:ln w="12700"/>
-        </p:spPr>
-        <p:style>
-          <a:lnRef idx="1">
-            <a:schemeClr val="accent1"/>
-          </a:lnRef>
-          <a:fillRef idx="0">
-            <a:schemeClr val="accent1"/>
-          </a:fillRef>
-          <a:effectRef idx="0">
-            <a:schemeClr val="accent1"/>
-          </a:effectRef>
-          <a:fontRef idx="minor">
-            <a:schemeClr val="tx1"/>
-          </a:fontRef>
-        </p:style>
-      </p:cxnSp>
-      <p:cxnSp>
-        <p:nvCxnSpPr>
-          <p:cNvPr id="1035" name="Straight Connector 1034">
-            <a:extLst>
-              <a:ext uri="{FF2B5EF4-FFF2-40B4-BE49-F238E27FC236}">
-                <a16:creationId xmlns:a16="http://schemas.microsoft.com/office/drawing/2014/main" id="{9372139C-4E32-AECF-C30F-FAC9B14074A1}"/>
-              </a:ext>
-            </a:extLst>
-          </p:cNvPr>
-          <p:cNvCxnSpPr>
-            <a:stCxn id="18" idx="1"/>
-            <a:endCxn id="33" idx="3"/>
-          </p:cNvCxnSpPr>
-          <p:nvPr/>
-        </p:nvCxnSpPr>
-        <p:spPr>
-          <a:xfrm flipH="1">
-            <a:off x="3949668" y="3860065"/>
-            <a:ext cx="571390" cy="0"/>
-          </a:xfrm>
-          <a:prstGeom prst="line">
-            <a:avLst/>
-          </a:prstGeom>
-          <a:ln w="12700"/>
-        </p:spPr>
-        <p:style>
-          <a:lnRef idx="1">
-            <a:schemeClr val="accent1"/>
-          </a:lnRef>
-          <a:fillRef idx="0">
-            <a:schemeClr val="accent1"/>
-          </a:fillRef>
-          <a:effectRef idx="0">
-            <a:schemeClr val="accent1"/>
-          </a:effectRef>
-          <a:fontRef idx="minor">
-            <a:schemeClr val="tx1"/>
-          </a:fontRef>
-        </p:style>
-      </p:cxnSp>
-      <p:cxnSp>
-        <p:nvCxnSpPr>
-          <p:cNvPr id="1039" name="Straight Connector 1038">
-            <a:extLst>
-              <a:ext uri="{FF2B5EF4-FFF2-40B4-BE49-F238E27FC236}">
-                <a16:creationId xmlns:a16="http://schemas.microsoft.com/office/drawing/2014/main" id="{D9C50FB4-4EDC-DB74-3A96-2B389F314A6F}"/>
-              </a:ext>
-            </a:extLst>
-          </p:cNvPr>
-          <p:cNvCxnSpPr>
-            <a:stCxn id="33" idx="1"/>
-            <a:endCxn id="1042" idx="3"/>
-          </p:cNvCxnSpPr>
-          <p:nvPr/>
-        </p:nvCxnSpPr>
-        <p:spPr>
-          <a:xfrm flipH="1">
-            <a:off x="2903037" y="3860065"/>
-            <a:ext cx="563563" cy="0"/>
-          </a:xfrm>
-          <a:prstGeom prst="line">
-            <a:avLst/>
-          </a:prstGeom>
-          <a:ln w="12700"/>
-        </p:spPr>
-        <p:style>
-          <a:lnRef idx="1">
-            <a:schemeClr val="accent1"/>
-          </a:lnRef>
-          <a:fillRef idx="0">
-            <a:schemeClr val="accent1"/>
-          </a:fillRef>
-          <a:effectRef idx="0">
-            <a:schemeClr val="accent1"/>
-          </a:effectRef>
-          <a:fontRef idx="minor">
-            <a:schemeClr val="tx1"/>
-          </a:fontRef>
-        </p:style>
-      </p:cxnSp>
-      <p:sp>
-        <p:nvSpPr>
-          <p:cNvPr id="1041" name="TextBox 1040">
-            <a:extLst>
-              <a:ext uri="{FF2B5EF4-FFF2-40B4-BE49-F238E27FC236}">
-                <a16:creationId xmlns:a16="http://schemas.microsoft.com/office/drawing/2014/main" id="{2F7F26C4-FC26-7384-1560-4B8C7AAD1251}"/>
-              </a:ext>
-            </a:extLst>
-          </p:cNvPr>
-          <p:cNvSpPr txBox="1"/>
-          <p:nvPr/>
-        </p:nvSpPr>
-        <p:spPr>
-          <a:xfrm>
-            <a:off x="276641" y="4288809"/>
-            <a:ext cx="712054" cy="369332"/>
+          </a:blip>
+          <a:stretch>
+            <a:fillRect/>
+          </a:stretch>
+        </p:blipFill>
+        <p:spPr>
+          <a:xfrm>
+            <a:off x="9157343" y="3821671"/>
+            <a:ext cx="912643" cy="912643"/>
           </a:xfrm>
           <a:prstGeom prst="rect">
             <a:avLst/>
           </a:prstGeom>
-          <a:noFill/>
-        </p:spPr>
-        <p:txBody>
-          <a:bodyPr wrap="none" rtlCol="0">
-            <a:spAutoFit/>
-          </a:bodyPr>
-          <a:lstStyle/>
-          <a:p>
-            <a:r>
-              <a:rPr lang="en-CO" dirty="0"/>
-              <a:t>UNAL</a:t>
-            </a:r>
-          </a:p>
-        </p:txBody>
-      </p:sp>
-      <p:sp>
-        <p:nvSpPr>
-          <p:cNvPr id="1043" name="TextBox 1042">
-            <a:extLst>
-              <a:ext uri="{FF2B5EF4-FFF2-40B4-BE49-F238E27FC236}">
-                <a16:creationId xmlns:a16="http://schemas.microsoft.com/office/drawing/2014/main" id="{74803D03-E6F0-531D-D9B6-C3DA34148B05}"/>
-              </a:ext>
-            </a:extLst>
-          </p:cNvPr>
-          <p:cNvSpPr txBox="1"/>
-          <p:nvPr/>
-        </p:nvSpPr>
-        <p:spPr>
-          <a:xfrm>
-            <a:off x="3244731" y="1390607"/>
-            <a:ext cx="596638" cy="369332"/>
-          </a:xfrm>
-          <a:prstGeom prst="rect">
-            <a:avLst/>
-          </a:prstGeom>
-          <a:noFill/>
-        </p:spPr>
-        <p:txBody>
-          <a:bodyPr wrap="none" rtlCol="0">
-            <a:spAutoFit/>
-          </a:bodyPr>
-          <a:lstStyle/>
-          <a:p>
-            <a:r>
-              <a:rPr lang="en-CO" dirty="0"/>
-              <a:t>PC 1</a:t>
-            </a:r>
-          </a:p>
-        </p:txBody>
-      </p:sp>
-      <p:sp>
-        <p:nvSpPr>
-          <p:cNvPr id="1045" name="TextBox 1044">
-            <a:extLst>
-              <a:ext uri="{FF2B5EF4-FFF2-40B4-BE49-F238E27FC236}">
-                <a16:creationId xmlns:a16="http://schemas.microsoft.com/office/drawing/2014/main" id="{7BAA2DD2-F1D0-1861-3A60-39E709448129}"/>
-              </a:ext>
-            </a:extLst>
-          </p:cNvPr>
-          <p:cNvSpPr txBox="1"/>
-          <p:nvPr/>
-        </p:nvSpPr>
-        <p:spPr>
-          <a:xfrm>
-            <a:off x="3535343" y="6335387"/>
-            <a:ext cx="596638" cy="369332"/>
-          </a:xfrm>
-          <a:prstGeom prst="rect">
-            <a:avLst/>
-          </a:prstGeom>
-          <a:noFill/>
-        </p:spPr>
-        <p:txBody>
-          <a:bodyPr wrap="none" rtlCol="0">
-            <a:spAutoFit/>
-          </a:bodyPr>
-          <a:lstStyle/>
-          <a:p>
-            <a:r>
-              <a:rPr lang="en-CO" dirty="0"/>
-              <a:t>PC 2</a:t>
-            </a:r>
-          </a:p>
-        </p:txBody>
-      </p:sp>
-      <p:sp>
-        <p:nvSpPr>
-          <p:cNvPr id="1047" name="TextBox 1046">
-            <a:extLst>
-              <a:ext uri="{FF2B5EF4-FFF2-40B4-BE49-F238E27FC236}">
-                <a16:creationId xmlns:a16="http://schemas.microsoft.com/office/drawing/2014/main" id="{40FD059F-D660-B47A-823F-98970585DC8A}"/>
-              </a:ext>
-            </a:extLst>
-          </p:cNvPr>
-          <p:cNvSpPr txBox="1"/>
-          <p:nvPr/>
-        </p:nvSpPr>
-        <p:spPr>
-          <a:xfrm>
-            <a:off x="8082109" y="6049418"/>
-            <a:ext cx="596638" cy="369332"/>
-          </a:xfrm>
-          <a:prstGeom prst="rect">
-            <a:avLst/>
-          </a:prstGeom>
-          <a:noFill/>
-        </p:spPr>
-        <p:txBody>
-          <a:bodyPr wrap="none" rtlCol="0">
-            <a:spAutoFit/>
-          </a:bodyPr>
-          <a:lstStyle/>
-          <a:p>
-            <a:r>
-              <a:rPr lang="en-CO" dirty="0"/>
-              <a:t>PC 3</a:t>
-            </a:r>
-          </a:p>
-        </p:txBody>
-      </p:sp>
-      <p:sp>
-        <p:nvSpPr>
-          <p:cNvPr id="1048" name="TextBox 1047">
-            <a:extLst>
-              <a:ext uri="{FF2B5EF4-FFF2-40B4-BE49-F238E27FC236}">
-                <a16:creationId xmlns:a16="http://schemas.microsoft.com/office/drawing/2014/main" id="{9E1B4327-238F-0A15-2C77-22E48CB99B25}"/>
-              </a:ext>
-            </a:extLst>
-          </p:cNvPr>
-          <p:cNvSpPr txBox="1"/>
-          <p:nvPr/>
-        </p:nvSpPr>
-        <p:spPr>
-          <a:xfrm>
-            <a:off x="7598285" y="3623033"/>
-            <a:ext cx="945067" cy="369332"/>
-          </a:xfrm>
-          <a:prstGeom prst="rect">
-            <a:avLst/>
-          </a:prstGeom>
-          <a:noFill/>
-        </p:spPr>
-        <p:txBody>
-          <a:bodyPr wrap="none" rtlCol="0">
-            <a:spAutoFit/>
-          </a:bodyPr>
-          <a:lstStyle/>
-          <a:p>
-            <a:r>
-              <a:rPr lang="en-CO" dirty="0"/>
-              <a:t>Internet</a:t>
-            </a:r>
-          </a:p>
-        </p:txBody>
-      </p:sp>
-      <p:sp>
-        <p:nvSpPr>
-          <p:cNvPr id="1049" name="TextBox 1048">
-            <a:extLst>
-              <a:ext uri="{FF2B5EF4-FFF2-40B4-BE49-F238E27FC236}">
-                <a16:creationId xmlns:a16="http://schemas.microsoft.com/office/drawing/2014/main" id="{A69E918D-D575-90E3-9E61-D45DF0695957}"/>
-              </a:ext>
-            </a:extLst>
-          </p:cNvPr>
-          <p:cNvSpPr txBox="1"/>
-          <p:nvPr/>
-        </p:nvSpPr>
-        <p:spPr>
-          <a:xfrm>
-            <a:off x="8610025" y="3033416"/>
-            <a:ext cx="675121" cy="369332"/>
-          </a:xfrm>
-          <a:prstGeom prst="rect">
-            <a:avLst/>
-          </a:prstGeom>
-          <a:noFill/>
-        </p:spPr>
-        <p:txBody>
-          <a:bodyPr wrap="none" rtlCol="0">
-            <a:spAutoFit/>
-          </a:bodyPr>
-          <a:lstStyle/>
-          <a:p>
-            <a:r>
-              <a:rPr lang="en-CO" dirty="0"/>
-              <a:t>HTTP</a:t>
-            </a:r>
-          </a:p>
-        </p:txBody>
-      </p:sp>
-      <p:sp>
-        <p:nvSpPr>
-          <p:cNvPr id="1051" name="TextBox 1050">
-            <a:extLst>
-              <a:ext uri="{FF2B5EF4-FFF2-40B4-BE49-F238E27FC236}">
-                <a16:creationId xmlns:a16="http://schemas.microsoft.com/office/drawing/2014/main" id="{DFA456B9-8198-2FBA-8D13-7BCC6C1D3922}"/>
-              </a:ext>
-            </a:extLst>
-          </p:cNvPr>
-          <p:cNvSpPr txBox="1"/>
-          <p:nvPr/>
-        </p:nvSpPr>
-        <p:spPr>
-          <a:xfrm>
-            <a:off x="10630423" y="5964617"/>
-            <a:ext cx="726481" cy="369332"/>
-          </a:xfrm>
-          <a:prstGeom prst="rect">
-            <a:avLst/>
-          </a:prstGeom>
-          <a:noFill/>
-        </p:spPr>
-        <p:txBody>
-          <a:bodyPr wrap="none" rtlCol="0">
-            <a:spAutoFit/>
-          </a:bodyPr>
-          <a:lstStyle/>
-          <a:p>
-            <a:r>
-              <a:rPr lang="en-CO" dirty="0"/>
-              <a:t>Cloud</a:t>
-            </a:r>
-          </a:p>
-        </p:txBody>
-      </p:sp>
+        </p:spPr>
+      </p:pic>
     </p:spTree>
     <p:extLst>
       <p:ext uri="{BB962C8B-B14F-4D97-AF65-F5344CB8AC3E}">

</xml_diff>